<commit_message>
1. Common export excel function 2. Add Description column in AppContract table.
</commit_message>
<xml_diff>
--- a/docs/1521050085 Phạm Trọng Nhân - Slide ĐATN.pptx
+++ b/docs/1521050085 Phạm Trọng Nhân - Slide ĐATN.pptx
@@ -14,11 +14,11 @@
     <p:sldId id="280" r:id="rId8"/>
     <p:sldId id="282" r:id="rId9"/>
     <p:sldId id="283" r:id="rId10"/>
-    <p:sldId id="284" r:id="rId11"/>
-    <p:sldId id="285" r:id="rId12"/>
-    <p:sldId id="286" r:id="rId13"/>
-    <p:sldId id="287" r:id="rId14"/>
-    <p:sldId id="288" r:id="rId15"/>
+    <p:sldId id="285" r:id="rId11"/>
+    <p:sldId id="290" r:id="rId12"/>
+    <p:sldId id="291" r:id="rId13"/>
+    <p:sldId id="293" r:id="rId14"/>
+    <p:sldId id="294" r:id="rId15"/>
     <p:sldId id="289" r:id="rId16"/>
     <p:sldId id="281" r:id="rId17"/>
   </p:sldIdLst>
@@ -256,7 +256,7 @@
           <a:p>
             <a:fld id="{23FDE437-CB40-417D-AC35-4A7E5D913317}" type="datetimeFigureOut">
               <a:rPr lang="en-GB" smtClean="0"/>
-              <a:t>19/05/2024</a:t>
+              <a:t>22/05/2024</a:t>
             </a:fld>
             <a:endParaRPr lang="en-GB"/>
           </a:p>
@@ -661,96 +661,6 @@
           <a:bodyPr/>
           <a:lstStyle/>
           <a:p>
-            <a:pPr marL="0" marR="0" indent="0" algn="l" defTabSz="914400" rtl="0" eaLnBrk="1" fontAlgn="auto" latinLnBrk="0" hangingPunct="1">
-              <a:lnSpc>
-                <a:spcPct val="100000"/>
-              </a:lnSpc>
-              <a:spcBef>
-                <a:spcPts val="0"/>
-              </a:spcBef>
-              <a:spcAft>
-                <a:spcPts val="0"/>
-              </a:spcAft>
-              <a:buClrTx/>
-              <a:buSzTx/>
-              <a:buFontTx/>
-              <a:buNone/>
-              <a:tabLst/>
-              <a:defRPr/>
-            </a:pPr>
-            <a:r>
-              <a:rPr lang="en-US" sz="1200" kern="1200" smtClean="0">
-                <a:solidFill>
-                  <a:schemeClr val="tx1"/>
-                </a:solidFill>
-                <a:effectLst/>
-                <a:latin typeface="+mn-lt"/>
-                <a:ea typeface="+mn-ea"/>
-                <a:cs typeface="+mn-cs"/>
-              </a:rPr>
-              <a:t>Angular là khung làm việc của Javascript MVC phía client (máy khách) với mục đích phát triển ứng dụng web động. Angular được xem là framework frontend mạnh mẽ</a:t>
-            </a:r>
-            <a:endParaRPr lang="en-US" baseline="0" smtClean="0"/>
-          </a:p>
-          <a:p>
-            <a:r>
-              <a:rPr lang="en-US" baseline="0" smtClean="0"/>
-              <a:t>Phát triển bởi </a:t>
-            </a:r>
-            <a:r>
-              <a:rPr lang="en-US" sz="1200" kern="1200" smtClean="0">
-                <a:solidFill>
-                  <a:schemeClr val="tx1"/>
-                </a:solidFill>
-                <a:effectLst/>
-                <a:latin typeface="+mn-lt"/>
-                <a:ea typeface="+mn-ea"/>
-                <a:cs typeface="+mn-cs"/>
-              </a:rPr>
-              <a:t>Misko Hevery, Google</a:t>
-            </a:r>
-            <a:r>
-              <a:rPr lang="en-US" sz="1200" kern="1200" baseline="0" smtClean="0">
-                <a:solidFill>
-                  <a:schemeClr val="tx1"/>
-                </a:solidFill>
-                <a:effectLst/>
-                <a:latin typeface="+mn-lt"/>
-                <a:ea typeface="+mn-ea"/>
-                <a:cs typeface="+mn-cs"/>
-              </a:rPr>
-              <a:t> mua lại năm 2009</a:t>
-            </a:r>
-          </a:p>
-          <a:p>
-            <a:r>
-              <a:rPr lang="en-US" sz="1200" kern="1200" baseline="0" smtClean="0">
-                <a:solidFill>
-                  <a:schemeClr val="tx1"/>
-                </a:solidFill>
-                <a:effectLst/>
-                <a:latin typeface="+mn-lt"/>
-                <a:ea typeface="+mn-ea"/>
-                <a:cs typeface="+mn-cs"/>
-              </a:rPr>
-              <a:t>Components,  Binding, module, service</a:t>
-            </a:r>
-          </a:p>
-          <a:p>
-            <a:r>
-              <a:rPr lang="en-US" sz="1200" kern="1200" baseline="0" smtClean="0">
-                <a:solidFill>
-                  <a:schemeClr val="tx1"/>
-                </a:solidFill>
-                <a:effectLst/>
-                <a:latin typeface="+mn-lt"/>
-                <a:ea typeface="+mn-ea"/>
-                <a:cs typeface="+mn-cs"/>
-              </a:rPr>
-              <a:t>Đa nền tảng, hiệu năng cao,  kiến trúc MVC,  binding 2 chiều</a:t>
-            </a:r>
-          </a:p>
-          <a:p>
             <a:endParaRPr lang="en-US" baseline="0" smtClean="0"/>
           </a:p>
         </p:txBody>
@@ -781,7 +691,7 @@
     </p:spTree>
     <p:extLst>
       <p:ext uri="{BB962C8B-B14F-4D97-AF65-F5344CB8AC3E}">
-        <p14:creationId xmlns:p14="http://schemas.microsoft.com/office/powerpoint/2010/main" val="914967697"/>
+        <p14:creationId xmlns:p14="http://schemas.microsoft.com/office/powerpoint/2010/main" val="1860621966"/>
       </p:ext>
     </p:extLst>
   </p:cSld>
@@ -1386,96 +1296,6 @@
           <a:bodyPr/>
           <a:lstStyle/>
           <a:p>
-            <a:pPr marL="0" marR="0" indent="0" algn="l" defTabSz="914400" rtl="0" eaLnBrk="1" fontAlgn="auto" latinLnBrk="0" hangingPunct="1">
-              <a:lnSpc>
-                <a:spcPct val="100000"/>
-              </a:lnSpc>
-              <a:spcBef>
-                <a:spcPts val="0"/>
-              </a:spcBef>
-              <a:spcAft>
-                <a:spcPts val="0"/>
-              </a:spcAft>
-              <a:buClrTx/>
-              <a:buSzTx/>
-              <a:buFontTx/>
-              <a:buNone/>
-              <a:tabLst/>
-              <a:defRPr/>
-            </a:pPr>
-            <a:r>
-              <a:rPr lang="en-US" sz="1200" kern="1200" smtClean="0">
-                <a:solidFill>
-                  <a:schemeClr val="tx1"/>
-                </a:solidFill>
-                <a:effectLst/>
-                <a:latin typeface="+mn-lt"/>
-                <a:ea typeface="+mn-ea"/>
-                <a:cs typeface="+mn-cs"/>
-              </a:rPr>
-              <a:t>Angular là khung làm việc của Javascript MVC phía client (máy khách) với mục đích phát triển ứng dụng web động. Angular được xem là framework frontend mạnh mẽ</a:t>
-            </a:r>
-            <a:endParaRPr lang="en-US" baseline="0" smtClean="0"/>
-          </a:p>
-          <a:p>
-            <a:r>
-              <a:rPr lang="en-US" baseline="0" smtClean="0"/>
-              <a:t>Phát triển bởi </a:t>
-            </a:r>
-            <a:r>
-              <a:rPr lang="en-US" sz="1200" kern="1200" smtClean="0">
-                <a:solidFill>
-                  <a:schemeClr val="tx1"/>
-                </a:solidFill>
-                <a:effectLst/>
-                <a:latin typeface="+mn-lt"/>
-                <a:ea typeface="+mn-ea"/>
-                <a:cs typeface="+mn-cs"/>
-              </a:rPr>
-              <a:t>Misko Hevery, Google</a:t>
-            </a:r>
-            <a:r>
-              <a:rPr lang="en-US" sz="1200" kern="1200" baseline="0" smtClean="0">
-                <a:solidFill>
-                  <a:schemeClr val="tx1"/>
-                </a:solidFill>
-                <a:effectLst/>
-                <a:latin typeface="+mn-lt"/>
-                <a:ea typeface="+mn-ea"/>
-                <a:cs typeface="+mn-cs"/>
-              </a:rPr>
-              <a:t> mua lại năm 2009</a:t>
-            </a:r>
-          </a:p>
-          <a:p>
-            <a:r>
-              <a:rPr lang="en-US" sz="1200" kern="1200" baseline="0" smtClean="0">
-                <a:solidFill>
-                  <a:schemeClr val="tx1"/>
-                </a:solidFill>
-                <a:effectLst/>
-                <a:latin typeface="+mn-lt"/>
-                <a:ea typeface="+mn-ea"/>
-                <a:cs typeface="+mn-cs"/>
-              </a:rPr>
-              <a:t>Components,  Binding, module, service</a:t>
-            </a:r>
-          </a:p>
-          <a:p>
-            <a:r>
-              <a:rPr lang="en-US" sz="1200" kern="1200" baseline="0" smtClean="0">
-                <a:solidFill>
-                  <a:schemeClr val="tx1"/>
-                </a:solidFill>
-                <a:effectLst/>
-                <a:latin typeface="+mn-lt"/>
-                <a:ea typeface="+mn-ea"/>
-                <a:cs typeface="+mn-cs"/>
-              </a:rPr>
-              <a:t>Đa nền tảng, hiệu năng cao,  kiến trúc MVC,  binding 2 chiều</a:t>
-            </a:r>
-          </a:p>
-          <a:p>
             <a:endParaRPr lang="en-US" baseline="0" smtClean="0"/>
           </a:p>
         </p:txBody>
@@ -1506,7 +1326,7 @@
     </p:spTree>
     <p:extLst>
       <p:ext uri="{BB962C8B-B14F-4D97-AF65-F5344CB8AC3E}">
-        <p14:creationId xmlns:p14="http://schemas.microsoft.com/office/powerpoint/2010/main" val="1062240821"/>
+        <p14:creationId xmlns:p14="http://schemas.microsoft.com/office/powerpoint/2010/main" val="2398151283"/>
       </p:ext>
     </p:extLst>
   </p:cSld>
@@ -1590,7 +1410,7 @@
     </p:spTree>
     <p:extLst>
       <p:ext uri="{BB962C8B-B14F-4D97-AF65-F5344CB8AC3E}">
-        <p14:creationId xmlns:p14="http://schemas.microsoft.com/office/powerpoint/2010/main" val="2398151283"/>
+        <p14:creationId xmlns:p14="http://schemas.microsoft.com/office/powerpoint/2010/main" val="547709548"/>
       </p:ext>
     </p:extLst>
   </p:cSld>
@@ -1674,7 +1494,7 @@
     </p:spTree>
     <p:extLst>
       <p:ext uri="{BB962C8B-B14F-4D97-AF65-F5344CB8AC3E}">
-        <p14:creationId xmlns:p14="http://schemas.microsoft.com/office/powerpoint/2010/main" val="1271105275"/>
+        <p14:creationId xmlns:p14="http://schemas.microsoft.com/office/powerpoint/2010/main" val="1142621856"/>
       </p:ext>
     </p:extLst>
   </p:cSld>
@@ -1758,7 +1578,7 @@
     </p:spTree>
     <p:extLst>
       <p:ext uri="{BB962C8B-B14F-4D97-AF65-F5344CB8AC3E}">
-        <p14:creationId xmlns:p14="http://schemas.microsoft.com/office/powerpoint/2010/main" val="1655388292"/>
+        <p14:creationId xmlns:p14="http://schemas.microsoft.com/office/powerpoint/2010/main" val="4192259226"/>
       </p:ext>
     </p:extLst>
   </p:cSld>
@@ -1957,7 +1777,7 @@
           <a:p>
             <a:fld id="{7855289C-09C2-4FA6-9DE7-15D89A7144DF}" type="datetime1">
               <a:rPr lang="vi-VN" smtClean="0"/>
-              <a:t>19/05/2024</a:t>
+              <a:t>22/05/2024</a:t>
             </a:fld>
             <a:endParaRPr lang="en-US"/>
           </a:p>
@@ -2205,7 +2025,7 @@
           <a:p>
             <a:fld id="{3BD01B09-9BFA-4E25-B6F7-A45121277496}" type="datetime1">
               <a:rPr lang="vi-VN" smtClean="0"/>
-              <a:t>19/05/2024</a:t>
+              <a:t>22/05/2024</a:t>
             </a:fld>
             <a:endParaRPr lang="en-US"/>
           </a:p>
@@ -2382,7 +2202,7 @@
           <a:p>
             <a:fld id="{2543A4BE-6657-4382-B365-D7D11ABF647C}" type="datetime1">
               <a:rPr lang="vi-VN" smtClean="0"/>
-              <a:t>19/05/2024</a:t>
+              <a:t>22/05/2024</a:t>
             </a:fld>
             <a:endParaRPr lang="en-US"/>
           </a:p>
@@ -2545,7 +2365,7 @@
           <a:p>
             <a:fld id="{8407D00D-E689-41A8-94DE-0AE5FDCE360B}" type="datetime1">
               <a:rPr lang="vi-VN" smtClean="0"/>
-              <a:t>19/05/2024</a:t>
+              <a:t>22/05/2024</a:t>
             </a:fld>
             <a:endParaRPr lang="en-US"/>
           </a:p>
@@ -2977,7 +2797,7 @@
           <a:p>
             <a:fld id="{027F032A-4D12-4362-8B1C-673C2DC6E831}" type="datetime1">
               <a:rPr lang="vi-VN" smtClean="0"/>
-              <a:t>19/05/2024</a:t>
+              <a:t>22/05/2024</a:t>
             </a:fld>
             <a:endParaRPr lang="en-US"/>
           </a:p>
@@ -4368,6 +4188,13 @@
   <p:clrMapOvr>
     <a:masterClrMapping/>
   </p:clrMapOvr>
+  <p:timing>
+    <p:tnLst>
+      <p:par>
+        <p:cTn id="1" dur="indefinite" restart="never" nodeType="tmRoot"/>
+      </p:par>
+    </p:tnLst>
+  </p:timing>
 </p:sld>
 </file>
 
@@ -4431,14 +4258,14 @@
             </a:pPr>
             <a:r>
               <a:rPr lang="en-US" sz="2800" smtClean="0"/>
-              <a:t>3.2 Use case quản lý thanh toán</a:t>
-            </a:r>
-          </a:p>
-          <a:p>
-            <a:pPr marL="0" indent="0">
-              <a:buNone/>
-            </a:pPr>
-            <a:endParaRPr lang="en-US" sz="2400" smtClean="0"/>
+              <a:t>3.2 Biểu đồ hoạt động</a:t>
+            </a:r>
+          </a:p>
+          <a:p>
+            <a:r>
+              <a:rPr lang="en-US" sz="2800" smtClean="0"/>
+              <a:t>Cho thuê phòng</a:t>
+            </a:r>
           </a:p>
         </p:txBody>
       </p:sp>
@@ -4459,7 +4286,7 @@
           <a:p>
             <a:fld id="{3BD01B09-9BFA-4E25-B6F7-A45121277496}" type="datetime1">
               <a:rPr lang="vi-VN" smtClean="0"/>
-              <a:t>19/05/2024</a:t>
+              <a:t>23/05/2024</a:t>
             </a:fld>
             <a:endParaRPr lang="en-US"/>
           </a:p>
@@ -4511,562 +4338,23 @@
           </a:p>
         </p:txBody>
       </p:sp>
-      <p:sp>
-        <p:nvSpPr>
-          <p:cNvPr id="7" name="Oval 6"/>
-          <p:cNvSpPr/>
-          <p:nvPr/>
-        </p:nvSpPr>
-        <p:spPr>
-          <a:xfrm>
-            <a:off x="1403648" y="3068960"/>
-            <a:ext cx="1728192" cy="864096"/>
-          </a:xfrm>
-          <a:prstGeom prst="ellipse">
-            <a:avLst/>
-          </a:prstGeom>
-          <a:solidFill>
-            <a:schemeClr val="tx1"/>
-          </a:solidFill>
-        </p:spPr>
-        <p:style>
-          <a:lnRef idx="2">
-            <a:schemeClr val="accent1">
-              <a:shade val="50000"/>
-            </a:schemeClr>
-          </a:lnRef>
-          <a:fillRef idx="1">
-            <a:schemeClr val="accent1"/>
-          </a:fillRef>
-          <a:effectRef idx="0">
-            <a:schemeClr val="accent1"/>
-          </a:effectRef>
-          <a:fontRef idx="minor">
-            <a:schemeClr val="lt1"/>
-          </a:fontRef>
-        </p:style>
-        <p:txBody>
-          <a:bodyPr rtlCol="0" anchor="ctr"/>
-          <a:lstStyle/>
-          <a:p>
-            <a:pPr algn="ctr"/>
-            <a:r>
-              <a:rPr lang="en-US" smtClean="0">
-                <a:solidFill>
-                  <a:schemeClr val="bg1"/>
-                </a:solidFill>
-                <a:latin typeface="Arial" panose="020B0604020202020204" pitchFamily="34" charset="0"/>
-                <a:cs typeface="Arial" panose="020B0604020202020204" pitchFamily="34" charset="0"/>
-              </a:rPr>
-              <a:t>Nhập thông tin</a:t>
-            </a:r>
-            <a:endParaRPr lang="en-US">
-              <a:solidFill>
-                <a:schemeClr val="bg1"/>
-              </a:solidFill>
-              <a:latin typeface="Arial" panose="020B0604020202020204" pitchFamily="34" charset="0"/>
-              <a:cs typeface="Arial" panose="020B0604020202020204" pitchFamily="34" charset="0"/>
-            </a:endParaRPr>
-          </a:p>
-        </p:txBody>
-      </p:sp>
-      <p:sp>
-        <p:nvSpPr>
-          <p:cNvPr id="8" name="Oval 7"/>
-          <p:cNvSpPr/>
-          <p:nvPr/>
-        </p:nvSpPr>
-        <p:spPr>
-          <a:xfrm>
-            <a:off x="3354865" y="2888005"/>
-            <a:ext cx="1728192" cy="864096"/>
-          </a:xfrm>
-          <a:prstGeom prst="ellipse">
-            <a:avLst/>
-          </a:prstGeom>
-          <a:solidFill>
-            <a:schemeClr val="tx1"/>
-          </a:solidFill>
-        </p:spPr>
-        <p:style>
-          <a:lnRef idx="2">
-            <a:schemeClr val="accent1">
-              <a:shade val="50000"/>
-            </a:schemeClr>
-          </a:lnRef>
-          <a:fillRef idx="1">
-            <a:schemeClr val="accent1"/>
-          </a:fillRef>
-          <a:effectRef idx="0">
-            <a:schemeClr val="accent1"/>
-          </a:effectRef>
-          <a:fontRef idx="minor">
-            <a:schemeClr val="lt1"/>
-          </a:fontRef>
-        </p:style>
-        <p:txBody>
-          <a:bodyPr rtlCol="0" anchor="ctr"/>
-          <a:lstStyle/>
-          <a:p>
-            <a:pPr algn="ctr"/>
-            <a:r>
-              <a:rPr lang="en-US" smtClean="0">
-                <a:solidFill>
-                  <a:schemeClr val="bg1"/>
-                </a:solidFill>
-                <a:latin typeface="Arial" panose="020B0604020202020204" pitchFamily="34" charset="0"/>
-                <a:cs typeface="Arial" panose="020B0604020202020204" pitchFamily="34" charset="0"/>
-              </a:rPr>
-              <a:t>Cập nhật trạng thái</a:t>
-            </a:r>
-            <a:endParaRPr lang="en-US">
-              <a:solidFill>
-                <a:schemeClr val="bg1"/>
-              </a:solidFill>
-              <a:latin typeface="Arial" panose="020B0604020202020204" pitchFamily="34" charset="0"/>
-              <a:cs typeface="Arial" panose="020B0604020202020204" pitchFamily="34" charset="0"/>
-            </a:endParaRPr>
-          </a:p>
-        </p:txBody>
-      </p:sp>
-      <p:sp>
-        <p:nvSpPr>
-          <p:cNvPr id="9" name="Oval 8"/>
-          <p:cNvSpPr/>
-          <p:nvPr/>
-        </p:nvSpPr>
-        <p:spPr>
-          <a:xfrm>
-            <a:off x="6817623" y="4189212"/>
-            <a:ext cx="1728192" cy="864096"/>
-          </a:xfrm>
-          <a:prstGeom prst="ellipse">
-            <a:avLst/>
-          </a:prstGeom>
-          <a:solidFill>
-            <a:schemeClr val="tx1"/>
-          </a:solidFill>
-        </p:spPr>
-        <p:style>
-          <a:lnRef idx="2">
-            <a:schemeClr val="accent1">
-              <a:shade val="50000"/>
-            </a:schemeClr>
-          </a:lnRef>
-          <a:fillRef idx="1">
-            <a:schemeClr val="accent1"/>
-          </a:fillRef>
-          <a:effectRef idx="0">
-            <a:schemeClr val="accent1"/>
-          </a:effectRef>
-          <a:fontRef idx="minor">
-            <a:schemeClr val="lt1"/>
-          </a:fontRef>
-        </p:style>
-        <p:txBody>
-          <a:bodyPr rtlCol="0" anchor="ctr"/>
-          <a:lstStyle/>
-          <a:p>
-            <a:pPr algn="ctr"/>
-            <a:r>
-              <a:rPr lang="en-US" smtClean="0">
-                <a:solidFill>
-                  <a:schemeClr val="bg1"/>
-                </a:solidFill>
-                <a:latin typeface="Arial" panose="020B0604020202020204" pitchFamily="34" charset="0"/>
-                <a:cs typeface="Arial" panose="020B0604020202020204" pitchFamily="34" charset="0"/>
-              </a:rPr>
-              <a:t>Cập nhật trạng thái</a:t>
-            </a:r>
-            <a:endParaRPr lang="en-US">
-              <a:solidFill>
-                <a:schemeClr val="bg1"/>
-              </a:solidFill>
-              <a:latin typeface="Arial" panose="020B0604020202020204" pitchFamily="34" charset="0"/>
-              <a:cs typeface="Arial" panose="020B0604020202020204" pitchFamily="34" charset="0"/>
-            </a:endParaRPr>
-          </a:p>
-        </p:txBody>
-      </p:sp>
-      <p:sp>
-        <p:nvSpPr>
-          <p:cNvPr id="10" name="Oval 9"/>
-          <p:cNvSpPr/>
-          <p:nvPr/>
-        </p:nvSpPr>
-        <p:spPr>
-          <a:xfrm>
-            <a:off x="827584" y="4365104"/>
-            <a:ext cx="1728192" cy="864096"/>
-          </a:xfrm>
-          <a:prstGeom prst="ellipse">
-            <a:avLst/>
-          </a:prstGeom>
-          <a:solidFill>
-            <a:schemeClr val="tx1"/>
-          </a:solidFill>
-        </p:spPr>
-        <p:style>
-          <a:lnRef idx="2">
-            <a:schemeClr val="accent1">
-              <a:shade val="50000"/>
-            </a:schemeClr>
-          </a:lnRef>
-          <a:fillRef idx="1">
-            <a:schemeClr val="accent1"/>
-          </a:fillRef>
-          <a:effectRef idx="0">
-            <a:schemeClr val="accent1"/>
-          </a:effectRef>
-          <a:fontRef idx="minor">
-            <a:schemeClr val="lt1"/>
-          </a:fontRef>
-        </p:style>
-        <p:txBody>
-          <a:bodyPr rtlCol="0" anchor="ctr"/>
-          <a:lstStyle/>
-          <a:p>
-            <a:pPr algn="ctr"/>
-            <a:r>
-              <a:rPr lang="en-US" smtClean="0">
-                <a:solidFill>
-                  <a:schemeClr val="bg1"/>
-                </a:solidFill>
-                <a:latin typeface="Arial" panose="020B0604020202020204" pitchFamily="34" charset="0"/>
-                <a:cs typeface="Arial" panose="020B0604020202020204" pitchFamily="34" charset="0"/>
-              </a:rPr>
-              <a:t>Thêm mới</a:t>
-            </a:r>
-            <a:endParaRPr lang="en-US">
-              <a:solidFill>
-                <a:schemeClr val="bg1"/>
-              </a:solidFill>
-              <a:latin typeface="Arial" panose="020B0604020202020204" pitchFamily="34" charset="0"/>
-              <a:cs typeface="Arial" panose="020B0604020202020204" pitchFamily="34" charset="0"/>
-            </a:endParaRPr>
-          </a:p>
-        </p:txBody>
-      </p:sp>
-      <p:sp>
-        <p:nvSpPr>
-          <p:cNvPr id="13" name="Oval 12"/>
-          <p:cNvSpPr/>
-          <p:nvPr/>
-        </p:nvSpPr>
-        <p:spPr>
-          <a:xfrm>
-            <a:off x="1704239" y="5585519"/>
-            <a:ext cx="1837318" cy="864096"/>
-          </a:xfrm>
-          <a:prstGeom prst="ellipse">
-            <a:avLst/>
-          </a:prstGeom>
-          <a:solidFill>
-            <a:schemeClr val="tx1"/>
-          </a:solidFill>
-        </p:spPr>
-        <p:style>
-          <a:lnRef idx="2">
-            <a:schemeClr val="accent1">
-              <a:shade val="50000"/>
-            </a:schemeClr>
-          </a:lnRef>
-          <a:fillRef idx="1">
-            <a:schemeClr val="accent1"/>
-          </a:fillRef>
-          <a:effectRef idx="0">
-            <a:schemeClr val="accent1"/>
-          </a:effectRef>
-          <a:fontRef idx="minor">
-            <a:schemeClr val="lt1"/>
-          </a:fontRef>
-        </p:style>
-        <p:txBody>
-          <a:bodyPr rtlCol="0" anchor="ctr"/>
-          <a:lstStyle/>
-          <a:p>
-            <a:pPr algn="ctr"/>
-            <a:r>
-              <a:rPr lang="en-US" smtClean="0">
-                <a:solidFill>
-                  <a:schemeClr val="bg1"/>
-                </a:solidFill>
-                <a:latin typeface="Arial" panose="020B0604020202020204" pitchFamily="34" charset="0"/>
-                <a:cs typeface="Arial" panose="020B0604020202020204" pitchFamily="34" charset="0"/>
-              </a:rPr>
-              <a:t>Xem Danh sách</a:t>
-            </a:r>
-            <a:endParaRPr lang="en-US">
-              <a:solidFill>
-                <a:schemeClr val="bg1"/>
-              </a:solidFill>
-              <a:latin typeface="Arial" panose="020B0604020202020204" pitchFamily="34" charset="0"/>
-              <a:cs typeface="Arial" panose="020B0604020202020204" pitchFamily="34" charset="0"/>
-            </a:endParaRPr>
-          </a:p>
-        </p:txBody>
-      </p:sp>
-      <p:sp>
-        <p:nvSpPr>
-          <p:cNvPr id="15" name="Rectangle 14"/>
-          <p:cNvSpPr/>
-          <p:nvPr/>
-        </p:nvSpPr>
-        <p:spPr>
-          <a:xfrm>
-            <a:off x="3491880" y="4365104"/>
-            <a:ext cx="1814202" cy="914400"/>
-          </a:xfrm>
-          <a:prstGeom prst="rect">
-            <a:avLst/>
-          </a:prstGeom>
-          <a:solidFill>
-            <a:schemeClr val="tx1"/>
-          </a:solidFill>
-        </p:spPr>
-        <p:style>
-          <a:lnRef idx="2">
-            <a:schemeClr val="accent1">
-              <a:shade val="50000"/>
-            </a:schemeClr>
-          </a:lnRef>
-          <a:fillRef idx="1">
-            <a:schemeClr val="accent1"/>
-          </a:fillRef>
-          <a:effectRef idx="0">
-            <a:schemeClr val="accent1"/>
-          </a:effectRef>
-          <a:fontRef idx="minor">
-            <a:schemeClr val="lt1"/>
-          </a:fontRef>
-        </p:style>
-        <p:txBody>
-          <a:bodyPr rtlCol="0" anchor="ctr"/>
-          <a:lstStyle/>
-          <a:p>
-            <a:pPr algn="ctr"/>
-            <a:r>
-              <a:rPr lang="en-US" sz="2000" smtClean="0">
-                <a:solidFill>
-                  <a:schemeClr val="bg1"/>
-                </a:solidFill>
-                <a:latin typeface="Arial" panose="020B0604020202020204" pitchFamily="34" charset="0"/>
-                <a:cs typeface="Arial" panose="020B0604020202020204" pitchFamily="34" charset="0"/>
-              </a:rPr>
-              <a:t>Chủ trọ</a:t>
-            </a:r>
-            <a:endParaRPr lang="en-US" sz="2000">
-              <a:solidFill>
-                <a:schemeClr val="bg1"/>
-              </a:solidFill>
-              <a:latin typeface="Arial" panose="020B0604020202020204" pitchFamily="34" charset="0"/>
-              <a:cs typeface="Arial" panose="020B0604020202020204" pitchFamily="34" charset="0"/>
-            </a:endParaRPr>
-          </a:p>
-        </p:txBody>
-      </p:sp>
-      <p:cxnSp>
-        <p:nvCxnSpPr>
-          <p:cNvPr id="17" name="Straight Arrow Connector 16"/>
-          <p:cNvCxnSpPr>
-            <a:endCxn id="7" idx="5"/>
-          </p:cNvCxnSpPr>
-          <p:nvPr/>
-        </p:nvCxnSpPr>
-        <p:spPr>
-          <a:xfrm flipH="1" flipV="1">
-            <a:off x="2878752" y="3806512"/>
-            <a:ext cx="613128" cy="558592"/>
-          </a:xfrm>
-          <a:prstGeom prst="straightConnector1">
-            <a:avLst/>
-          </a:prstGeom>
-          <a:ln w="28575">
-            <a:solidFill>
-              <a:schemeClr val="tx1"/>
-            </a:solidFill>
-            <a:tailEnd type="triangle"/>
-          </a:ln>
-        </p:spPr>
-        <p:style>
-          <a:lnRef idx="1">
-            <a:schemeClr val="accent1"/>
-          </a:lnRef>
-          <a:fillRef idx="0">
-            <a:schemeClr val="accent1"/>
-          </a:fillRef>
-          <a:effectRef idx="0">
-            <a:schemeClr val="accent1"/>
-          </a:effectRef>
-          <a:fontRef idx="minor">
-            <a:schemeClr val="tx1"/>
-          </a:fontRef>
-        </p:style>
-      </p:cxnSp>
-      <p:cxnSp>
-        <p:nvCxnSpPr>
-          <p:cNvPr id="18" name="Straight Arrow Connector 17"/>
-          <p:cNvCxnSpPr>
-            <a:endCxn id="8" idx="4"/>
-          </p:cNvCxnSpPr>
-          <p:nvPr/>
-        </p:nvCxnSpPr>
-        <p:spPr>
-          <a:xfrm flipV="1">
-            <a:off x="4218961" y="3752101"/>
-            <a:ext cx="0" cy="613003"/>
-          </a:xfrm>
-          <a:prstGeom prst="straightConnector1">
-            <a:avLst/>
-          </a:prstGeom>
-          <a:ln w="28575">
-            <a:solidFill>
-              <a:schemeClr val="tx1"/>
-            </a:solidFill>
-            <a:tailEnd type="triangle"/>
-          </a:ln>
-        </p:spPr>
-        <p:style>
-          <a:lnRef idx="1">
-            <a:schemeClr val="accent1"/>
-          </a:lnRef>
-          <a:fillRef idx="0">
-            <a:schemeClr val="accent1"/>
-          </a:fillRef>
-          <a:effectRef idx="0">
-            <a:schemeClr val="accent1"/>
-          </a:effectRef>
-          <a:fontRef idx="minor">
-            <a:schemeClr val="tx1"/>
-          </a:fontRef>
-        </p:style>
-      </p:cxnSp>
-      <p:cxnSp>
-        <p:nvCxnSpPr>
-          <p:cNvPr id="21" name="Straight Arrow Connector 20"/>
-          <p:cNvCxnSpPr>
-            <a:stCxn id="15" idx="3"/>
-            <a:endCxn id="9" idx="2"/>
-          </p:cNvCxnSpPr>
-          <p:nvPr/>
-        </p:nvCxnSpPr>
-        <p:spPr>
-          <a:xfrm flipV="1">
-            <a:off x="5306082" y="4621260"/>
-            <a:ext cx="1511541" cy="201044"/>
-          </a:xfrm>
-          <a:prstGeom prst="straightConnector1">
-            <a:avLst/>
-          </a:prstGeom>
-          <a:ln w="28575">
-            <a:solidFill>
-              <a:schemeClr val="tx1"/>
-            </a:solidFill>
-            <a:tailEnd type="triangle"/>
-          </a:ln>
-        </p:spPr>
-        <p:style>
-          <a:lnRef idx="1">
-            <a:schemeClr val="accent1"/>
-          </a:lnRef>
-          <a:fillRef idx="0">
-            <a:schemeClr val="accent1"/>
-          </a:fillRef>
-          <a:effectRef idx="0">
-            <a:schemeClr val="accent1"/>
-          </a:effectRef>
-          <a:fontRef idx="minor">
-            <a:schemeClr val="tx1"/>
-          </a:fontRef>
-        </p:style>
-      </p:cxnSp>
-      <p:cxnSp>
-        <p:nvCxnSpPr>
-          <p:cNvPr id="31" name="Straight Arrow Connector 30"/>
-          <p:cNvCxnSpPr>
-            <a:endCxn id="10" idx="6"/>
-          </p:cNvCxnSpPr>
-          <p:nvPr/>
-        </p:nvCxnSpPr>
-        <p:spPr>
-          <a:xfrm flipH="1">
-            <a:off x="2555776" y="4709731"/>
-            <a:ext cx="936104" cy="87421"/>
-          </a:xfrm>
-          <a:prstGeom prst="straightConnector1">
-            <a:avLst/>
-          </a:prstGeom>
-          <a:ln w="28575">
-            <a:solidFill>
-              <a:schemeClr val="tx1"/>
-            </a:solidFill>
-            <a:tailEnd type="triangle"/>
-          </a:ln>
-        </p:spPr>
-        <p:style>
-          <a:lnRef idx="1">
-            <a:schemeClr val="accent1"/>
-          </a:lnRef>
-          <a:fillRef idx="0">
-            <a:schemeClr val="accent1"/>
-          </a:fillRef>
-          <a:effectRef idx="0">
-            <a:schemeClr val="accent1"/>
-          </a:effectRef>
-          <a:fontRef idx="minor">
-            <a:schemeClr val="tx1"/>
-          </a:fontRef>
-        </p:style>
-      </p:cxnSp>
-      <p:cxnSp>
-        <p:nvCxnSpPr>
-          <p:cNvPr id="34" name="Straight Arrow Connector 33"/>
-          <p:cNvCxnSpPr>
-            <a:stCxn id="15" idx="3"/>
-            <a:endCxn id="13" idx="7"/>
-          </p:cNvCxnSpPr>
-          <p:nvPr/>
-        </p:nvCxnSpPr>
-        <p:spPr>
-          <a:xfrm flipH="1">
-            <a:off x="3272488" y="4822304"/>
-            <a:ext cx="2033594" cy="889759"/>
-          </a:xfrm>
-          <a:prstGeom prst="straightConnector1">
-            <a:avLst/>
-          </a:prstGeom>
-          <a:ln w="28575">
-            <a:solidFill>
-              <a:schemeClr val="tx1"/>
-            </a:solidFill>
-            <a:tailEnd type="triangle"/>
-          </a:ln>
-        </p:spPr>
-        <p:style>
-          <a:lnRef idx="1">
-            <a:schemeClr val="accent1"/>
-          </a:lnRef>
-          <a:fillRef idx="0">
-            <a:schemeClr val="accent1"/>
-          </a:fillRef>
-          <a:effectRef idx="0">
-            <a:schemeClr val="accent1"/>
-          </a:effectRef>
-          <a:fontRef idx="minor">
-            <a:schemeClr val="tx1"/>
-          </a:fontRef>
-        </p:style>
-      </p:cxnSp>
     </p:spTree>
     <p:extLst>
       <p:ext uri="{BB962C8B-B14F-4D97-AF65-F5344CB8AC3E}">
-        <p14:creationId xmlns:p14="http://schemas.microsoft.com/office/powerpoint/2010/main" val="1064403295"/>
+        <p14:creationId xmlns:p14="http://schemas.microsoft.com/office/powerpoint/2010/main" val="3392090433"/>
       </p:ext>
     </p:extLst>
   </p:cSld>
   <p:clrMapOvr>
     <a:masterClrMapping/>
   </p:clrMapOvr>
+  <p:timing>
+    <p:tnLst>
+      <p:par>
+        <p:cTn id="1" dur="indefinite" restart="never" nodeType="tmRoot"/>
+      </p:par>
+    </p:tnLst>
+  </p:timing>
 </p:sld>
 </file>
 
@@ -5103,8 +4391,12 @@
           <a:lstStyle/>
           <a:p>
             <a:r>
+              <a:rPr lang="en-US"/>
+              <a:t>4</a:t>
+            </a:r>
+            <a:r>
               <a:rPr lang="en-US" smtClean="0"/>
-              <a:t>4. Cài đặt và chạy thử</a:t>
+              <a:t>. CÀI ĐẶT VÀ KIỂM THỬ</a:t>
             </a:r>
             <a:endParaRPr lang="en-US"/>
           </a:p>
@@ -5125,25 +4417,13 @@
           <a:bodyPr/>
           <a:lstStyle/>
           <a:p>
-            <a:pPr marL="0" indent="0" algn="ctr">
+            <a:pPr marL="0" indent="0">
               <a:buNone/>
             </a:pPr>
             <a:r>
               <a:rPr lang="en-US" sz="2800" smtClean="0"/>
-              <a:t>Chạy thử hệ thống</a:t>
-            </a:r>
-          </a:p>
-          <a:p>
-            <a:pPr marL="0" indent="0" algn="ctr">
-              <a:buNone/>
-            </a:pPr>
-            <a:endParaRPr lang="en-US" sz="2400" smtClean="0"/>
-          </a:p>
-          <a:p>
-            <a:pPr marL="0" indent="0" algn="ctr">
-              <a:buNone/>
-            </a:pPr>
-            <a:endParaRPr lang="en-US" sz="2400" smtClean="0"/>
+              <a:t>DEMO HỆ THỐNG</a:t>
+            </a:r>
           </a:p>
         </p:txBody>
       </p:sp>
@@ -5164,7 +4444,7 @@
           <a:p>
             <a:fld id="{3BD01B09-9BFA-4E25-B6F7-A45121277496}" type="datetime1">
               <a:rPr lang="vi-VN" smtClean="0"/>
-              <a:t>19/05/2024</a:t>
+              <a:t>23/05/2024</a:t>
             </a:fld>
             <a:endParaRPr lang="en-US"/>
           </a:p>
@@ -5219,13 +4499,20 @@
     </p:spTree>
     <p:extLst>
       <p:ext uri="{BB962C8B-B14F-4D97-AF65-F5344CB8AC3E}">
-        <p14:creationId xmlns:p14="http://schemas.microsoft.com/office/powerpoint/2010/main" val="869209700"/>
+        <p14:creationId xmlns:p14="http://schemas.microsoft.com/office/powerpoint/2010/main" val="3724157078"/>
       </p:ext>
     </p:extLst>
   </p:cSld>
   <p:clrMapOvr>
     <a:masterClrMapping/>
   </p:clrMapOvr>
+  <p:timing>
+    <p:tnLst>
+      <p:par>
+        <p:cTn id="1" dur="indefinite" restart="never" nodeType="tmRoot"/>
+      </p:par>
+    </p:tnLst>
+  </p:timing>
 </p:sld>
 </file>
 
@@ -5336,7 +4623,7 @@
           <a:p>
             <a:fld id="{3BD01B09-9BFA-4E25-B6F7-A45121277496}" type="datetime1">
               <a:rPr lang="vi-VN" smtClean="0"/>
-              <a:t>19/05/2024</a:t>
+              <a:t>22/05/2024</a:t>
             </a:fld>
             <a:endParaRPr lang="en-US"/>
           </a:p>
@@ -5398,6 +4685,13 @@
   <p:clrMapOvr>
     <a:masterClrMapping/>
   </p:clrMapOvr>
+  <p:timing>
+    <p:tnLst>
+      <p:par>
+        <p:cTn id="1" dur="indefinite" restart="never" nodeType="tmRoot"/>
+      </p:par>
+    </p:tnLst>
+  </p:timing>
 </p:sld>
 </file>
 
@@ -5456,6 +4750,13 @@
   <p:clrMapOvr>
     <a:masterClrMapping/>
   </p:clrMapOvr>
+  <p:timing>
+    <p:tnLst>
+      <p:par>
+        <p:cTn id="1" dur="indefinite" restart="never" nodeType="tmRoot"/>
+      </p:par>
+    </p:tnLst>
+  </p:timing>
 </p:sld>
 </file>
 
@@ -8026,7 +7327,7 @@
           <a:p>
             <a:fld id="{9F7832CC-CCC0-4F72-B15C-9F1CE024F690}" type="datetime1">
               <a:rPr lang="vi-VN" smtClean="0"/>
-              <a:t>19/05/2024</a:t>
+              <a:t>22/05/2024</a:t>
             </a:fld>
             <a:endParaRPr lang="en-US"/>
           </a:p>
@@ -8088,6 +7389,13 @@
   <p:clrMapOvr>
     <a:masterClrMapping/>
   </p:clrMapOvr>
+  <p:timing>
+    <p:tnLst>
+      <p:par>
+        <p:cTn id="1" dur="indefinite" restart="never" nodeType="tmRoot"/>
+      </p:par>
+    </p:tnLst>
+  </p:timing>
 </p:sld>
 </file>
 
@@ -8125,7 +7433,11 @@
           <a:p>
             <a:r>
               <a:rPr lang="en-US" smtClean="0"/>
-              <a:t>Giới thiệu đề tài</a:t>
+              <a:t>1.Giới </a:t>
+            </a:r>
+            <a:r>
+              <a:rPr lang="en-US" smtClean="0"/>
+              <a:t>thiệu đề tài</a:t>
             </a:r>
             <a:endParaRPr lang="en-US"/>
           </a:p>
@@ -8158,7 +7470,7 @@
             </a:pPr>
             <a:r>
               <a:rPr lang="en-US" sz="2400" smtClean="0"/>
-              <a:t>Cho thuê trọ là hình thức kinh doanh phổ biến</a:t>
+              <a:t>1.1 Mục tiêu</a:t>
             </a:r>
           </a:p>
           <a:p>
@@ -8167,8 +7479,27 @@
             </a:pPr>
             <a:r>
               <a:rPr lang="en-US" sz="2400" smtClean="0"/>
-              <a:t>Chi phí đầu tư lớn và có nguồn thu ổn định</a:t>
-            </a:r>
+              <a:t>Nghiên cứu tổng quan về công nghệ</a:t>
+            </a:r>
+          </a:p>
+          <a:p>
+            <a:r>
+              <a:rPr lang="en-US" sz="2400" smtClean="0"/>
+              <a:t>ASP NET</a:t>
+            </a:r>
+          </a:p>
+          <a:p>
+            <a:r>
+              <a:rPr lang="en-US" sz="2400" smtClean="0"/>
+              <a:t>Angular 9</a:t>
+            </a:r>
+          </a:p>
+          <a:p>
+            <a:r>
+              <a:rPr lang="en-US" sz="2400" smtClean="0"/>
+              <a:t>Ứng dụng để xây dựng phần mềm quản lý nhà trọ</a:t>
+            </a:r>
+            <a:endParaRPr lang="en-US" sz="2400" smtClean="0"/>
           </a:p>
           <a:p>
             <a:pPr marL="0" indent="0">
@@ -8195,7 +7526,7 @@
           <a:p>
             <a:fld id="{34E2A69B-FDB5-4466-BB51-CBA224CE8AC8}" type="datetime1">
               <a:rPr lang="vi-VN" smtClean="0"/>
-              <a:t>19/05/2024</a:t>
+              <a:t>22/05/2024</a:t>
             </a:fld>
             <a:endParaRPr lang="en-US"/>
           </a:p>
@@ -8257,6 +7588,13 @@
   <p:clrMapOvr>
     <a:masterClrMapping/>
   </p:clrMapOvr>
+  <p:timing>
+    <p:tnLst>
+      <p:par>
+        <p:cTn id="1" dur="indefinite" restart="never" nodeType="tmRoot"/>
+      </p:par>
+    </p:tnLst>
+  </p:timing>
 </p:sld>
 </file>
 
@@ -8340,11 +7678,7 @@
             </a:pPr>
             <a:r>
               <a:rPr lang="en-US" sz="2400" smtClean="0"/>
-              <a:t>Chủ trọ Nguyễn Thế Khánh (</a:t>
-            </a:r>
-            <a:r>
-              <a:rPr lang="en-US" sz="2400" smtClean="0"/>
-              <a:t>0364.109.554)</a:t>
+              <a:t>Chủ trọ Nguyễn Thế Khánh (0364.109.554)</a:t>
             </a:r>
             <a:endParaRPr lang="en-US" sz="2400"/>
           </a:p>
@@ -8367,7 +7701,7 @@
           <a:p>
             <a:fld id="{3BD01B09-9BFA-4E25-B6F7-A45121277496}" type="datetime1">
               <a:rPr lang="vi-VN" smtClean="0"/>
-              <a:t>19/05/2024</a:t>
+              <a:t>22/05/2024</a:t>
             </a:fld>
             <a:endParaRPr lang="en-US"/>
           </a:p>
@@ -8429,6 +7763,13 @@
   <p:clrMapOvr>
     <a:masterClrMapping/>
   </p:clrMapOvr>
+  <p:timing>
+    <p:tnLst>
+      <p:par>
+        <p:cTn id="1" dur="indefinite" restart="never" nodeType="tmRoot"/>
+      </p:par>
+    </p:tnLst>
+  </p:timing>
 </p:sld>
 </file>
 
@@ -8533,7 +7874,7 @@
           <a:p>
             <a:fld id="{3BD01B09-9BFA-4E25-B6F7-A45121277496}" type="datetime1">
               <a:rPr lang="vi-VN" smtClean="0"/>
-              <a:t>19/05/2024</a:t>
+              <a:t>22/05/2024</a:t>
             </a:fld>
             <a:endParaRPr lang="en-US"/>
           </a:p>
@@ -8595,6 +7936,13 @@
   <p:clrMapOvr>
     <a:masterClrMapping/>
   </p:clrMapOvr>
+  <p:timing>
+    <p:tnLst>
+      <p:par>
+        <p:cTn id="1" dur="indefinite" restart="never" nodeType="tmRoot"/>
+      </p:par>
+    </p:tnLst>
+  </p:timing>
 </p:sld>
 </file>
 
@@ -8692,7 +8040,51 @@
             </a:pPr>
             <a:r>
               <a:rPr lang="en-US" sz="2400" smtClean="0"/>
-              <a:t>JSON &amp; XML</a:t>
+              <a:t>JSON &amp; </a:t>
+            </a:r>
+            <a:r>
+              <a:rPr lang="en-US" sz="2400" smtClean="0"/>
+              <a:t>XML</a:t>
+            </a:r>
+          </a:p>
+          <a:p>
+            <a:pPr marL="0" indent="0">
+              <a:buNone/>
+            </a:pPr>
+            <a:r>
+              <a:rPr lang="en-US" sz="2400" smtClean="0"/>
+              <a:t>2.2 Angular 9</a:t>
+            </a:r>
+            <a:endParaRPr lang="en-US" sz="2400" smtClean="0"/>
+          </a:p>
+          <a:p>
+            <a:pPr>
+              <a:buFont typeface="Arial" panose="020B0604020202020204" pitchFamily="34" charset="0"/>
+              <a:buChar char="•"/>
+            </a:pPr>
+            <a:r>
+              <a:rPr lang="en-US" sz="2400"/>
+              <a:t>Lịch sử phát triển</a:t>
+            </a:r>
+          </a:p>
+          <a:p>
+            <a:pPr>
+              <a:buFont typeface="Arial" panose="020B0604020202020204" pitchFamily="34" charset="0"/>
+              <a:buChar char="•"/>
+            </a:pPr>
+            <a:r>
+              <a:rPr lang="en-US" sz="2400"/>
+              <a:t>Các thành phần cơ bản</a:t>
+            </a:r>
+          </a:p>
+          <a:p>
+            <a:pPr>
+              <a:buFont typeface="Arial" panose="020B0604020202020204" pitchFamily="34" charset="0"/>
+              <a:buChar char="•"/>
+            </a:pPr>
+            <a:r>
+              <a:rPr lang="en-US" sz="2400"/>
+              <a:t>Ưu điểm</a:t>
             </a:r>
           </a:p>
           <a:p>
@@ -8720,7 +8112,7 @@
           <a:p>
             <a:fld id="{3BD01B09-9BFA-4E25-B6F7-A45121277496}" type="datetime1">
               <a:rPr lang="vi-VN" smtClean="0"/>
-              <a:t>19/05/2024</a:t>
+              <a:t>23/05/2024</a:t>
             </a:fld>
             <a:endParaRPr lang="en-US"/>
           </a:p>
@@ -8782,6 +8174,13 @@
   <p:clrMapOvr>
     <a:masterClrMapping/>
   </p:clrMapOvr>
+  <p:timing>
+    <p:tnLst>
+      <p:par>
+        <p:cTn id="1" dur="indefinite" restart="never" nodeType="tmRoot"/>
+      </p:par>
+    </p:tnLst>
+  </p:timing>
 </p:sld>
 </file>
 
@@ -8818,12 +8217,8 @@
           <a:lstStyle/>
           <a:p>
             <a:r>
-              <a:rPr lang="en-US"/>
-              <a:t>2</a:t>
-            </a:r>
-            <a:r>
               <a:rPr lang="en-US" smtClean="0"/>
-              <a:t>. CƠ SỞ LÝ THUYẾT</a:t>
+              <a:t>3. PHÂN TÍCH THIẾT KẾ HỆ THỐNG</a:t>
             </a:r>
             <a:endParaRPr lang="en-US"/>
           </a:p>
@@ -8849,37 +8244,7 @@
             </a:pPr>
             <a:r>
               <a:rPr lang="en-US" sz="2800" smtClean="0"/>
-              <a:t>2.1 Angular framework</a:t>
-            </a:r>
-          </a:p>
-          <a:p>
-            <a:pPr>
-              <a:buFont typeface="Arial" panose="020B0604020202020204" pitchFamily="34" charset="0"/>
-              <a:buChar char="•"/>
-            </a:pPr>
-            <a:r>
-              <a:rPr lang="en-US" sz="2400" smtClean="0"/>
-              <a:t>Lịch sử phát triển</a:t>
-            </a:r>
-          </a:p>
-          <a:p>
-            <a:pPr>
-              <a:buFont typeface="Arial" panose="020B0604020202020204" pitchFamily="34" charset="0"/>
-              <a:buChar char="•"/>
-            </a:pPr>
-            <a:r>
-              <a:rPr lang="en-US" sz="2400" smtClean="0"/>
-              <a:t>Các thành phần cơ bản</a:t>
-            </a:r>
-          </a:p>
-          <a:p>
-            <a:pPr>
-              <a:buFont typeface="Arial" panose="020B0604020202020204" pitchFamily="34" charset="0"/>
-              <a:buChar char="•"/>
-            </a:pPr>
-            <a:r>
-              <a:rPr lang="en-US" sz="2400" smtClean="0"/>
-              <a:t>Ưu điểm</a:t>
+              <a:t>3.1 Use case tổng quát</a:t>
             </a:r>
           </a:p>
           <a:p>
@@ -8907,7 +8272,7 @@
           <a:p>
             <a:fld id="{3BD01B09-9BFA-4E25-B6F7-A45121277496}" type="datetime1">
               <a:rPr lang="vi-VN" smtClean="0"/>
-              <a:t>19/05/2024</a:t>
+              <a:t>22/05/2024</a:t>
             </a:fld>
             <a:endParaRPr lang="en-US"/>
           </a:p>
@@ -8959,16 +8324,165 @@
           </a:p>
         </p:txBody>
       </p:sp>
+      <p:pic>
+        <p:nvPicPr>
+          <p:cNvPr id="25" name="Picture 24"/>
+          <p:cNvPicPr/>
+          <p:nvPr/>
+        </p:nvPicPr>
+        <p:blipFill>
+          <a:blip r:embed="rId3">
+            <a:extLst>
+              <a:ext uri="{28A0092B-C50C-407E-A947-70E740481C1C}">
+                <a14:useLocalDpi xmlns:a14="http://schemas.microsoft.com/office/drawing/2010/main" val="0"/>
+              </a:ext>
+            </a:extLst>
+          </a:blip>
+          <a:stretch>
+            <a:fillRect/>
+          </a:stretch>
+        </p:blipFill>
+        <p:spPr>
+          <a:xfrm>
+            <a:off x="611560" y="258910"/>
+            <a:ext cx="7528592" cy="6186596"/>
+          </a:xfrm>
+          <a:prstGeom prst="rect">
+            <a:avLst/>
+          </a:prstGeom>
+        </p:spPr>
+      </p:pic>
     </p:spTree>
     <p:extLst>
       <p:ext uri="{BB962C8B-B14F-4D97-AF65-F5344CB8AC3E}">
-        <p14:creationId xmlns:p14="http://schemas.microsoft.com/office/powerpoint/2010/main" val="35959148"/>
+        <p14:creationId xmlns:p14="http://schemas.microsoft.com/office/powerpoint/2010/main" val="2726121724"/>
       </p:ext>
     </p:extLst>
   </p:cSld>
   <p:clrMapOvr>
     <a:masterClrMapping/>
   </p:clrMapOvr>
+  <p:timing>
+    <p:tnLst>
+      <p:par>
+        <p:cTn id="1" dur="indefinite" restart="never" nodeType="tmRoot">
+          <p:childTnLst>
+            <p:seq concurrent="1" nextAc="seek">
+              <p:cTn id="2" dur="indefinite" nodeType="mainSeq">
+                <p:childTnLst>
+                  <p:par>
+                    <p:cTn id="3" fill="hold">
+                      <p:stCondLst>
+                        <p:cond delay="indefinite"/>
+                      </p:stCondLst>
+                      <p:childTnLst>
+                        <p:par>
+                          <p:cTn id="4" fill="hold">
+                            <p:stCondLst>
+                              <p:cond delay="0"/>
+                            </p:stCondLst>
+                            <p:childTnLst>
+                              <p:par>
+                                <p:cTn id="5" presetID="2" presetClass="entr" presetSubtype="4" fill="hold" nodeType="clickEffect">
+                                  <p:stCondLst>
+                                    <p:cond delay="0"/>
+                                  </p:stCondLst>
+                                  <p:childTnLst>
+                                    <p:set>
+                                      <p:cBhvr>
+                                        <p:cTn id="6" dur="1" fill="hold">
+                                          <p:stCondLst>
+                                            <p:cond delay="0"/>
+                                          </p:stCondLst>
+                                        </p:cTn>
+                                        <p:tgtEl>
+                                          <p:spTgt spid="25"/>
+                                        </p:tgtEl>
+                                        <p:attrNameLst>
+                                          <p:attrName>style.visibility</p:attrName>
+                                        </p:attrNameLst>
+                                      </p:cBhvr>
+                                      <p:to>
+                                        <p:strVal val="visible"/>
+                                      </p:to>
+                                    </p:set>
+                                    <p:anim calcmode="lin" valueType="num">
+                                      <p:cBhvr additive="base">
+                                        <p:cTn id="7" dur="500" fill="hold"/>
+                                        <p:tgtEl>
+                                          <p:spTgt spid="25"/>
+                                        </p:tgtEl>
+                                        <p:attrNameLst>
+                                          <p:attrName>ppt_x</p:attrName>
+                                        </p:attrNameLst>
+                                      </p:cBhvr>
+                                      <p:tavLst>
+                                        <p:tav tm="0">
+                                          <p:val>
+                                            <p:strVal val="#ppt_x"/>
+                                          </p:val>
+                                        </p:tav>
+                                        <p:tav tm="100000">
+                                          <p:val>
+                                            <p:strVal val="#ppt_x"/>
+                                          </p:val>
+                                        </p:tav>
+                                      </p:tavLst>
+                                    </p:anim>
+                                    <p:anim calcmode="lin" valueType="num">
+                                      <p:cBhvr additive="base">
+                                        <p:cTn id="8" dur="500" fill="hold"/>
+                                        <p:tgtEl>
+                                          <p:spTgt spid="25"/>
+                                        </p:tgtEl>
+                                        <p:attrNameLst>
+                                          <p:attrName>ppt_y</p:attrName>
+                                        </p:attrNameLst>
+                                      </p:cBhvr>
+                                      <p:tavLst>
+                                        <p:tav tm="0">
+                                          <p:val>
+                                            <p:strVal val="1+#ppt_h/2"/>
+                                          </p:val>
+                                        </p:tav>
+                                        <p:tav tm="100000">
+                                          <p:val>
+                                            <p:strVal val="#ppt_y"/>
+                                          </p:val>
+                                        </p:tav>
+                                      </p:tavLst>
+                                    </p:anim>
+                                  </p:childTnLst>
+                                </p:cTn>
+                              </p:par>
+                            </p:childTnLst>
+                          </p:cTn>
+                        </p:par>
+                      </p:childTnLst>
+                    </p:cTn>
+                  </p:par>
+                </p:childTnLst>
+              </p:cTn>
+              <p:prevCondLst>
+                <p:cond evt="onPrev" delay="0">
+                  <p:tgtEl>
+                    <p:sldTgt/>
+                  </p:tgtEl>
+                </p:cond>
+              </p:prevCondLst>
+              <p:nextCondLst>
+                <p:cond evt="onNext" delay="0">
+                  <p:tgtEl>
+                    <p:sldTgt/>
+                  </p:tgtEl>
+                </p:cond>
+              </p:nextCondLst>
+            </p:seq>
+          </p:childTnLst>
+        </p:cTn>
+      </p:par>
+    </p:tnLst>
+  </p:timing>
 </p:sld>
 </file>
 
@@ -9032,14 +8546,14 @@
             </a:pPr>
             <a:r>
               <a:rPr lang="en-US" sz="2800" smtClean="0"/>
-              <a:t>3.1 Use case tổng quát</a:t>
-            </a:r>
-          </a:p>
-          <a:p>
-            <a:pPr marL="0" indent="0">
-              <a:buNone/>
-            </a:pPr>
-            <a:endParaRPr lang="en-US" sz="2400" smtClean="0"/>
+              <a:t>3.2 Use case chi tiết</a:t>
+            </a:r>
+          </a:p>
+          <a:p>
+            <a:r>
+              <a:rPr lang="en-US" sz="2800" smtClean="0"/>
+              <a:t>Quản lý phòng trọ</a:t>
+            </a:r>
           </a:p>
         </p:txBody>
       </p:sp>
@@ -9060,7 +8574,7 @@
           <a:p>
             <a:fld id="{3BD01B09-9BFA-4E25-B6F7-A45121277496}" type="datetime1">
               <a:rPr lang="vi-VN" smtClean="0"/>
-              <a:t>19/05/2024</a:t>
+              <a:t>22/05/2024</a:t>
             </a:fld>
             <a:endParaRPr lang="en-US"/>
           </a:p>
@@ -9112,429 +8626,28 @@
           </a:p>
         </p:txBody>
       </p:sp>
-      <p:sp>
-        <p:nvSpPr>
-          <p:cNvPr id="7" name="Oval 6"/>
-          <p:cNvSpPr/>
+      <p:pic>
+        <p:nvPicPr>
+          <p:cNvPr id="11" name="Picture 10"/>
+          <p:cNvPicPr/>
           <p:nvPr/>
-        </p:nvSpPr>
+        </p:nvPicPr>
+        <p:blipFill>
+          <a:blip r:embed="rId3">
+            <a:extLst>
+              <a:ext uri="{28A0092B-C50C-407E-A947-70E740481C1C}">
+                <a14:useLocalDpi xmlns:a14="http://schemas.microsoft.com/office/drawing/2010/main" val="0"/>
+              </a:ext>
+            </a:extLst>
+          </a:blip>
+          <a:stretch>
+            <a:fillRect/>
+          </a:stretch>
+        </p:blipFill>
         <p:spPr>
           <a:xfrm>
-            <a:off x="1403648" y="3068960"/>
-            <a:ext cx="1728192" cy="864096"/>
-          </a:xfrm>
-          <a:prstGeom prst="ellipse">
-            <a:avLst/>
-          </a:prstGeom>
-          <a:solidFill>
-            <a:schemeClr val="tx1"/>
-          </a:solidFill>
-        </p:spPr>
-        <p:style>
-          <a:lnRef idx="2">
-            <a:schemeClr val="accent1">
-              <a:shade val="50000"/>
-            </a:schemeClr>
-          </a:lnRef>
-          <a:fillRef idx="1">
-            <a:schemeClr val="accent1"/>
-          </a:fillRef>
-          <a:effectRef idx="0">
-            <a:schemeClr val="accent1"/>
-          </a:effectRef>
-          <a:fontRef idx="minor">
-            <a:schemeClr val="lt1"/>
-          </a:fontRef>
-        </p:style>
-        <p:txBody>
-          <a:bodyPr rtlCol="0" anchor="ctr"/>
-          <a:lstStyle/>
-          <a:p>
-            <a:pPr algn="ctr"/>
-            <a:r>
-              <a:rPr lang="en-US" smtClean="0">
-                <a:solidFill>
-                  <a:schemeClr val="bg1"/>
-                </a:solidFill>
-                <a:latin typeface="Arial" panose="020B0604020202020204" pitchFamily="34" charset="0"/>
-                <a:cs typeface="Arial" panose="020B0604020202020204" pitchFamily="34" charset="0"/>
-              </a:rPr>
-              <a:t>Khu trọ</a:t>
-            </a:r>
-            <a:endParaRPr lang="en-US">
-              <a:solidFill>
-                <a:schemeClr val="bg1"/>
-              </a:solidFill>
-              <a:latin typeface="Arial" panose="020B0604020202020204" pitchFamily="34" charset="0"/>
-              <a:cs typeface="Arial" panose="020B0604020202020204" pitchFamily="34" charset="0"/>
-            </a:endParaRPr>
-          </a:p>
-        </p:txBody>
-      </p:sp>
-      <p:sp>
-        <p:nvSpPr>
-          <p:cNvPr id="8" name="Oval 7"/>
-          <p:cNvSpPr/>
-          <p:nvPr/>
-        </p:nvSpPr>
-        <p:spPr>
-          <a:xfrm>
-            <a:off x="3354865" y="2888005"/>
-            <a:ext cx="1728192" cy="864096"/>
-          </a:xfrm>
-          <a:prstGeom prst="ellipse">
-            <a:avLst/>
-          </a:prstGeom>
-          <a:solidFill>
-            <a:schemeClr val="tx1"/>
-          </a:solidFill>
-        </p:spPr>
-        <p:style>
-          <a:lnRef idx="2">
-            <a:schemeClr val="accent1">
-              <a:shade val="50000"/>
-            </a:schemeClr>
-          </a:lnRef>
-          <a:fillRef idx="1">
-            <a:schemeClr val="accent1"/>
-          </a:fillRef>
-          <a:effectRef idx="0">
-            <a:schemeClr val="accent1"/>
-          </a:effectRef>
-          <a:fontRef idx="minor">
-            <a:schemeClr val="lt1"/>
-          </a:fontRef>
-        </p:style>
-        <p:txBody>
-          <a:bodyPr rtlCol="0" anchor="ctr"/>
-          <a:lstStyle/>
-          <a:p>
-            <a:pPr algn="ctr"/>
-            <a:r>
-              <a:rPr lang="en-US" smtClean="0">
-                <a:solidFill>
-                  <a:schemeClr val="bg1"/>
-                </a:solidFill>
-                <a:latin typeface="Arial" panose="020B0604020202020204" pitchFamily="34" charset="0"/>
-                <a:cs typeface="Arial" panose="020B0604020202020204" pitchFamily="34" charset="0"/>
-              </a:rPr>
-              <a:t>Dịch vụ</a:t>
-            </a:r>
-            <a:endParaRPr lang="en-US">
-              <a:solidFill>
-                <a:schemeClr val="bg1"/>
-              </a:solidFill>
-              <a:latin typeface="Arial" panose="020B0604020202020204" pitchFamily="34" charset="0"/>
-              <a:cs typeface="Arial" panose="020B0604020202020204" pitchFamily="34" charset="0"/>
-            </a:endParaRPr>
-          </a:p>
-        </p:txBody>
-      </p:sp>
-      <p:sp>
-        <p:nvSpPr>
-          <p:cNvPr id="9" name="Oval 8"/>
-          <p:cNvSpPr/>
-          <p:nvPr/>
-        </p:nvSpPr>
-        <p:spPr>
-          <a:xfrm>
-            <a:off x="5306082" y="2888005"/>
-            <a:ext cx="1728192" cy="864096"/>
-          </a:xfrm>
-          <a:prstGeom prst="ellipse">
-            <a:avLst/>
-          </a:prstGeom>
-          <a:solidFill>
-            <a:schemeClr val="tx1"/>
-          </a:solidFill>
-        </p:spPr>
-        <p:style>
-          <a:lnRef idx="2">
-            <a:schemeClr val="accent1">
-              <a:shade val="50000"/>
-            </a:schemeClr>
-          </a:lnRef>
-          <a:fillRef idx="1">
-            <a:schemeClr val="accent1"/>
-          </a:fillRef>
-          <a:effectRef idx="0">
-            <a:schemeClr val="accent1"/>
-          </a:effectRef>
-          <a:fontRef idx="minor">
-            <a:schemeClr val="lt1"/>
-          </a:fontRef>
-        </p:style>
-        <p:txBody>
-          <a:bodyPr rtlCol="0" anchor="ctr"/>
-          <a:lstStyle/>
-          <a:p>
-            <a:pPr algn="ctr"/>
-            <a:r>
-              <a:rPr lang="en-US" smtClean="0">
-                <a:solidFill>
-                  <a:schemeClr val="bg1"/>
-                </a:solidFill>
-                <a:latin typeface="Arial" panose="020B0604020202020204" pitchFamily="34" charset="0"/>
-                <a:cs typeface="Arial" panose="020B0604020202020204" pitchFamily="34" charset="0"/>
-              </a:rPr>
-              <a:t>Khách hàng</a:t>
-            </a:r>
-            <a:endParaRPr lang="en-US">
-              <a:solidFill>
-                <a:schemeClr val="bg1"/>
-              </a:solidFill>
-              <a:latin typeface="Arial" panose="020B0604020202020204" pitchFamily="34" charset="0"/>
-              <a:cs typeface="Arial" panose="020B0604020202020204" pitchFamily="34" charset="0"/>
-            </a:endParaRPr>
-          </a:p>
-        </p:txBody>
-      </p:sp>
-      <p:sp>
-        <p:nvSpPr>
-          <p:cNvPr id="10" name="Oval 9"/>
-          <p:cNvSpPr/>
-          <p:nvPr/>
-        </p:nvSpPr>
-        <p:spPr>
-          <a:xfrm>
-            <a:off x="827584" y="4365104"/>
-            <a:ext cx="1728192" cy="864096"/>
-          </a:xfrm>
-          <a:prstGeom prst="ellipse">
-            <a:avLst/>
-          </a:prstGeom>
-          <a:solidFill>
-            <a:schemeClr val="tx1"/>
-          </a:solidFill>
-        </p:spPr>
-        <p:style>
-          <a:lnRef idx="2">
-            <a:schemeClr val="accent1">
-              <a:shade val="50000"/>
-            </a:schemeClr>
-          </a:lnRef>
-          <a:fillRef idx="1">
-            <a:schemeClr val="accent1"/>
-          </a:fillRef>
-          <a:effectRef idx="0">
-            <a:schemeClr val="accent1"/>
-          </a:effectRef>
-          <a:fontRef idx="minor">
-            <a:schemeClr val="lt1"/>
-          </a:fontRef>
-        </p:style>
-        <p:txBody>
-          <a:bodyPr rtlCol="0" anchor="ctr"/>
-          <a:lstStyle/>
-          <a:p>
-            <a:pPr algn="ctr"/>
-            <a:r>
-              <a:rPr lang="en-US" smtClean="0">
-                <a:solidFill>
-                  <a:schemeClr val="bg1"/>
-                </a:solidFill>
-                <a:latin typeface="Arial" panose="020B0604020202020204" pitchFamily="34" charset="0"/>
-                <a:cs typeface="Arial" panose="020B0604020202020204" pitchFamily="34" charset="0"/>
-              </a:rPr>
-              <a:t>Thanh toán</a:t>
-            </a:r>
-            <a:endParaRPr lang="en-US">
-              <a:solidFill>
-                <a:schemeClr val="bg1"/>
-              </a:solidFill>
-              <a:latin typeface="Arial" panose="020B0604020202020204" pitchFamily="34" charset="0"/>
-              <a:cs typeface="Arial" panose="020B0604020202020204" pitchFamily="34" charset="0"/>
-            </a:endParaRPr>
-          </a:p>
-        </p:txBody>
-      </p:sp>
-      <p:sp>
-        <p:nvSpPr>
-          <p:cNvPr id="11" name="Oval 10"/>
-          <p:cNvSpPr/>
-          <p:nvPr/>
-        </p:nvSpPr>
-        <p:spPr>
-          <a:xfrm>
-            <a:off x="6588224" y="3863471"/>
-            <a:ext cx="1728192" cy="864096"/>
-          </a:xfrm>
-          <a:prstGeom prst="ellipse">
-            <a:avLst/>
-          </a:prstGeom>
-          <a:solidFill>
-            <a:schemeClr val="tx1"/>
-          </a:solidFill>
-        </p:spPr>
-        <p:style>
-          <a:lnRef idx="2">
-            <a:schemeClr val="accent1">
-              <a:shade val="50000"/>
-            </a:schemeClr>
-          </a:lnRef>
-          <a:fillRef idx="1">
-            <a:schemeClr val="accent1"/>
-          </a:fillRef>
-          <a:effectRef idx="0">
-            <a:schemeClr val="accent1"/>
-          </a:effectRef>
-          <a:fontRef idx="minor">
-            <a:schemeClr val="lt1"/>
-          </a:fontRef>
-        </p:style>
-        <p:txBody>
-          <a:bodyPr rtlCol="0" anchor="ctr"/>
-          <a:lstStyle/>
-          <a:p>
-            <a:pPr algn="ctr"/>
-            <a:r>
-              <a:rPr lang="en-US" smtClean="0">
-                <a:solidFill>
-                  <a:schemeClr val="bg1"/>
-                </a:solidFill>
-                <a:latin typeface="Arial" panose="020B0604020202020204" pitchFamily="34" charset="0"/>
-                <a:cs typeface="Arial" panose="020B0604020202020204" pitchFamily="34" charset="0"/>
-              </a:rPr>
-              <a:t>Thiết bị</a:t>
-            </a:r>
-            <a:endParaRPr lang="en-US">
-              <a:solidFill>
-                <a:schemeClr val="bg1"/>
-              </a:solidFill>
-              <a:latin typeface="Arial" panose="020B0604020202020204" pitchFamily="34" charset="0"/>
-              <a:cs typeface="Arial" panose="020B0604020202020204" pitchFamily="34" charset="0"/>
-            </a:endParaRPr>
-          </a:p>
-        </p:txBody>
-      </p:sp>
-      <p:sp>
-        <p:nvSpPr>
-          <p:cNvPr id="12" name="Oval 11"/>
-          <p:cNvSpPr/>
-          <p:nvPr/>
-        </p:nvSpPr>
-        <p:spPr>
-          <a:xfrm>
-            <a:off x="6084168" y="5229200"/>
-            <a:ext cx="1728192" cy="864096"/>
-          </a:xfrm>
-          <a:prstGeom prst="ellipse">
-            <a:avLst/>
-          </a:prstGeom>
-          <a:solidFill>
-            <a:schemeClr val="tx1"/>
-          </a:solidFill>
-        </p:spPr>
-        <p:style>
-          <a:lnRef idx="2">
-            <a:schemeClr val="accent1">
-              <a:shade val="50000"/>
-            </a:schemeClr>
-          </a:lnRef>
-          <a:fillRef idx="1">
-            <a:schemeClr val="accent1"/>
-          </a:fillRef>
-          <a:effectRef idx="0">
-            <a:schemeClr val="accent1"/>
-          </a:effectRef>
-          <a:fontRef idx="minor">
-            <a:schemeClr val="lt1"/>
-          </a:fontRef>
-        </p:style>
-        <p:txBody>
-          <a:bodyPr rtlCol="0" anchor="ctr"/>
-          <a:lstStyle/>
-          <a:p>
-            <a:pPr algn="ctr"/>
-            <a:r>
-              <a:rPr lang="en-US" smtClean="0">
-                <a:solidFill>
-                  <a:schemeClr val="bg1"/>
-                </a:solidFill>
-                <a:latin typeface="Arial" panose="020B0604020202020204" pitchFamily="34" charset="0"/>
-                <a:cs typeface="Arial" panose="020B0604020202020204" pitchFamily="34" charset="0"/>
-              </a:rPr>
-              <a:t>Hợp đồng</a:t>
-            </a:r>
-            <a:endParaRPr lang="en-US">
-              <a:solidFill>
-                <a:schemeClr val="bg1"/>
-              </a:solidFill>
-              <a:latin typeface="Arial" panose="020B0604020202020204" pitchFamily="34" charset="0"/>
-              <a:cs typeface="Arial" panose="020B0604020202020204" pitchFamily="34" charset="0"/>
-            </a:endParaRPr>
-          </a:p>
-        </p:txBody>
-      </p:sp>
-      <p:sp>
-        <p:nvSpPr>
-          <p:cNvPr id="13" name="Oval 12"/>
-          <p:cNvSpPr/>
-          <p:nvPr/>
-        </p:nvSpPr>
-        <p:spPr>
-          <a:xfrm>
-            <a:off x="1475656" y="5461865"/>
-            <a:ext cx="1728192" cy="864096"/>
-          </a:xfrm>
-          <a:prstGeom prst="ellipse">
-            <a:avLst/>
-          </a:prstGeom>
-          <a:solidFill>
-            <a:schemeClr val="tx1"/>
-          </a:solidFill>
-        </p:spPr>
-        <p:style>
-          <a:lnRef idx="2">
-            <a:schemeClr val="accent1">
-              <a:shade val="50000"/>
-            </a:schemeClr>
-          </a:lnRef>
-          <a:fillRef idx="1">
-            <a:schemeClr val="accent1"/>
-          </a:fillRef>
-          <a:effectRef idx="0">
-            <a:schemeClr val="accent1"/>
-          </a:effectRef>
-          <a:fontRef idx="minor">
-            <a:schemeClr val="lt1"/>
-          </a:fontRef>
-        </p:style>
-        <p:txBody>
-          <a:bodyPr rtlCol="0" anchor="ctr"/>
-          <a:lstStyle/>
-          <a:p>
-            <a:pPr algn="ctr"/>
-            <a:r>
-              <a:rPr lang="en-US" smtClean="0">
-                <a:solidFill>
-                  <a:schemeClr val="bg1"/>
-                </a:solidFill>
-                <a:latin typeface="Arial" panose="020B0604020202020204" pitchFamily="34" charset="0"/>
-                <a:cs typeface="Arial" panose="020B0604020202020204" pitchFamily="34" charset="0"/>
-              </a:rPr>
-              <a:t>Báo cáo</a:t>
-            </a:r>
-            <a:endParaRPr lang="en-US">
-              <a:solidFill>
-                <a:schemeClr val="bg1"/>
-              </a:solidFill>
-              <a:latin typeface="Arial" panose="020B0604020202020204" pitchFamily="34" charset="0"/>
-              <a:cs typeface="Arial" panose="020B0604020202020204" pitchFamily="34" charset="0"/>
-            </a:endParaRPr>
-          </a:p>
-        </p:txBody>
-      </p:sp>
-      <p:sp>
-        <p:nvSpPr>
-          <p:cNvPr id="15" name="Rectangle 14"/>
-          <p:cNvSpPr/>
-          <p:nvPr/>
-        </p:nvSpPr>
-        <p:spPr>
-          <a:xfrm>
-            <a:off x="3491880" y="4365104"/>
-            <a:ext cx="1814202" cy="914400"/>
+            <a:off x="678060" y="452718"/>
+            <a:ext cx="7787879" cy="5816982"/>
           </a:xfrm>
           <a:prstGeom prst="rect">
             <a:avLst/>
@@ -9543,320 +8656,100 @@
             <a:schemeClr val="tx1"/>
           </a:solidFill>
         </p:spPr>
-        <p:style>
-          <a:lnRef idx="2">
-            <a:schemeClr val="accent1">
-              <a:shade val="50000"/>
-            </a:schemeClr>
-          </a:lnRef>
-          <a:fillRef idx="1">
-            <a:schemeClr val="accent1"/>
-          </a:fillRef>
-          <a:effectRef idx="0">
-            <a:schemeClr val="accent1"/>
-          </a:effectRef>
-          <a:fontRef idx="minor">
-            <a:schemeClr val="lt1"/>
-          </a:fontRef>
-        </p:style>
-        <p:txBody>
-          <a:bodyPr rtlCol="0" anchor="ctr"/>
-          <a:lstStyle/>
-          <a:p>
-            <a:pPr algn="ctr"/>
-            <a:r>
-              <a:rPr lang="en-US" sz="2000" smtClean="0">
-                <a:solidFill>
-                  <a:schemeClr val="bg1"/>
-                </a:solidFill>
-                <a:latin typeface="Arial" panose="020B0604020202020204" pitchFamily="34" charset="0"/>
-                <a:cs typeface="Arial" panose="020B0604020202020204" pitchFamily="34" charset="0"/>
-              </a:rPr>
-              <a:t>Chủ trọ</a:t>
-            </a:r>
-            <a:endParaRPr lang="en-US" sz="2000">
-              <a:solidFill>
-                <a:schemeClr val="bg1"/>
-              </a:solidFill>
-              <a:latin typeface="Arial" panose="020B0604020202020204" pitchFamily="34" charset="0"/>
-              <a:cs typeface="Arial" panose="020B0604020202020204" pitchFamily="34" charset="0"/>
-            </a:endParaRPr>
-          </a:p>
-        </p:txBody>
-      </p:sp>
-      <p:cxnSp>
-        <p:nvCxnSpPr>
-          <p:cNvPr id="17" name="Straight Arrow Connector 16"/>
-          <p:cNvCxnSpPr>
-            <a:endCxn id="7" idx="5"/>
-          </p:cNvCxnSpPr>
-          <p:nvPr/>
-        </p:nvCxnSpPr>
-        <p:spPr>
-          <a:xfrm flipH="1" flipV="1">
-            <a:off x="2878752" y="3806512"/>
-            <a:ext cx="613128" cy="558592"/>
-          </a:xfrm>
-          <a:prstGeom prst="straightConnector1">
-            <a:avLst/>
-          </a:prstGeom>
-          <a:ln w="28575">
-            <a:solidFill>
-              <a:schemeClr val="tx1"/>
-            </a:solidFill>
-            <a:tailEnd type="triangle"/>
-          </a:ln>
-        </p:spPr>
-        <p:style>
-          <a:lnRef idx="1">
-            <a:schemeClr val="accent1"/>
-          </a:lnRef>
-          <a:fillRef idx="0">
-            <a:schemeClr val="accent1"/>
-          </a:fillRef>
-          <a:effectRef idx="0">
-            <a:schemeClr val="accent1"/>
-          </a:effectRef>
-          <a:fontRef idx="minor">
-            <a:schemeClr val="tx1"/>
-          </a:fontRef>
-        </p:style>
-      </p:cxnSp>
-      <p:cxnSp>
-        <p:nvCxnSpPr>
-          <p:cNvPr id="18" name="Straight Arrow Connector 17"/>
-          <p:cNvCxnSpPr>
-            <a:endCxn id="8" idx="4"/>
-          </p:cNvCxnSpPr>
-          <p:nvPr/>
-        </p:nvCxnSpPr>
-        <p:spPr>
-          <a:xfrm flipV="1">
-            <a:off x="4218961" y="3752101"/>
-            <a:ext cx="0" cy="613003"/>
-          </a:xfrm>
-          <a:prstGeom prst="straightConnector1">
-            <a:avLst/>
-          </a:prstGeom>
-          <a:ln w="28575">
-            <a:solidFill>
-              <a:schemeClr val="tx1"/>
-            </a:solidFill>
-            <a:tailEnd type="triangle"/>
-          </a:ln>
-        </p:spPr>
-        <p:style>
-          <a:lnRef idx="1">
-            <a:schemeClr val="accent1"/>
-          </a:lnRef>
-          <a:fillRef idx="0">
-            <a:schemeClr val="accent1"/>
-          </a:fillRef>
-          <a:effectRef idx="0">
-            <a:schemeClr val="accent1"/>
-          </a:effectRef>
-          <a:fontRef idx="minor">
-            <a:schemeClr val="tx1"/>
-          </a:fontRef>
-        </p:style>
-      </p:cxnSp>
-      <p:cxnSp>
-        <p:nvCxnSpPr>
-          <p:cNvPr id="21" name="Straight Arrow Connector 20"/>
-          <p:cNvCxnSpPr/>
-          <p:nvPr/>
-        </p:nvCxnSpPr>
-        <p:spPr>
-          <a:xfrm flipV="1">
-            <a:off x="4966984" y="3688830"/>
-            <a:ext cx="894158" cy="676274"/>
-          </a:xfrm>
-          <a:prstGeom prst="straightConnector1">
-            <a:avLst/>
-          </a:prstGeom>
-          <a:ln w="28575">
-            <a:solidFill>
-              <a:schemeClr val="tx1"/>
-            </a:solidFill>
-            <a:tailEnd type="triangle"/>
-          </a:ln>
-        </p:spPr>
-        <p:style>
-          <a:lnRef idx="1">
-            <a:schemeClr val="accent1"/>
-          </a:lnRef>
-          <a:fillRef idx="0">
-            <a:schemeClr val="accent1"/>
-          </a:fillRef>
-          <a:effectRef idx="0">
-            <a:schemeClr val="accent1"/>
-          </a:effectRef>
-          <a:fontRef idx="minor">
-            <a:schemeClr val="tx1"/>
-          </a:fontRef>
-        </p:style>
-      </p:cxnSp>
-      <p:cxnSp>
-        <p:nvCxnSpPr>
-          <p:cNvPr id="24" name="Straight Arrow Connector 23"/>
-          <p:cNvCxnSpPr>
-            <a:stCxn id="15" idx="3"/>
-            <a:endCxn id="11" idx="2"/>
-          </p:cNvCxnSpPr>
-          <p:nvPr/>
-        </p:nvCxnSpPr>
-        <p:spPr>
-          <a:xfrm flipV="1">
-            <a:off x="5306082" y="4295519"/>
-            <a:ext cx="1282142" cy="526785"/>
-          </a:xfrm>
-          <a:prstGeom prst="straightConnector1">
-            <a:avLst/>
-          </a:prstGeom>
-          <a:ln w="28575">
-            <a:solidFill>
-              <a:schemeClr val="tx1"/>
-            </a:solidFill>
-            <a:tailEnd type="triangle"/>
-          </a:ln>
-        </p:spPr>
-        <p:style>
-          <a:lnRef idx="1">
-            <a:schemeClr val="accent1"/>
-          </a:lnRef>
-          <a:fillRef idx="0">
-            <a:schemeClr val="accent1"/>
-          </a:fillRef>
-          <a:effectRef idx="0">
-            <a:schemeClr val="accent1"/>
-          </a:effectRef>
-          <a:fontRef idx="minor">
-            <a:schemeClr val="tx1"/>
-          </a:fontRef>
-        </p:style>
-      </p:cxnSp>
-      <p:cxnSp>
-        <p:nvCxnSpPr>
-          <p:cNvPr id="27" name="Straight Arrow Connector 26"/>
-          <p:cNvCxnSpPr>
-            <a:endCxn id="12" idx="2"/>
-          </p:cNvCxnSpPr>
-          <p:nvPr/>
-        </p:nvCxnSpPr>
-        <p:spPr>
-          <a:xfrm>
-            <a:off x="5306082" y="5000636"/>
-            <a:ext cx="778086" cy="660612"/>
-          </a:xfrm>
-          <a:prstGeom prst="straightConnector1">
-            <a:avLst/>
-          </a:prstGeom>
-          <a:ln w="28575">
-            <a:solidFill>
-              <a:schemeClr val="tx1"/>
-            </a:solidFill>
-            <a:tailEnd type="triangle"/>
-          </a:ln>
-        </p:spPr>
-        <p:style>
-          <a:lnRef idx="1">
-            <a:schemeClr val="accent1"/>
-          </a:lnRef>
-          <a:fillRef idx="0">
-            <a:schemeClr val="accent1"/>
-          </a:fillRef>
-          <a:effectRef idx="0">
-            <a:schemeClr val="accent1"/>
-          </a:effectRef>
-          <a:fontRef idx="minor">
-            <a:schemeClr val="tx1"/>
-          </a:fontRef>
-        </p:style>
-      </p:cxnSp>
-      <p:cxnSp>
-        <p:nvCxnSpPr>
-          <p:cNvPr id="31" name="Straight Arrow Connector 30"/>
-          <p:cNvCxnSpPr>
-            <a:endCxn id="10" idx="6"/>
-          </p:cNvCxnSpPr>
-          <p:nvPr/>
-        </p:nvCxnSpPr>
-        <p:spPr>
-          <a:xfrm flipH="1">
-            <a:off x="2555776" y="4709731"/>
-            <a:ext cx="936104" cy="87421"/>
-          </a:xfrm>
-          <a:prstGeom prst="straightConnector1">
-            <a:avLst/>
-          </a:prstGeom>
-          <a:ln w="28575">
-            <a:solidFill>
-              <a:schemeClr val="tx1"/>
-            </a:solidFill>
-            <a:tailEnd type="triangle"/>
-          </a:ln>
-        </p:spPr>
-        <p:style>
-          <a:lnRef idx="1">
-            <a:schemeClr val="accent1"/>
-          </a:lnRef>
-          <a:fillRef idx="0">
-            <a:schemeClr val="accent1"/>
-          </a:fillRef>
-          <a:effectRef idx="0">
-            <a:schemeClr val="accent1"/>
-          </a:effectRef>
-          <a:fontRef idx="minor">
-            <a:schemeClr val="tx1"/>
-          </a:fontRef>
-        </p:style>
-      </p:cxnSp>
-      <p:cxnSp>
-        <p:nvCxnSpPr>
-          <p:cNvPr id="34" name="Straight Arrow Connector 33"/>
-          <p:cNvCxnSpPr/>
-          <p:nvPr/>
-        </p:nvCxnSpPr>
-        <p:spPr>
-          <a:xfrm flipH="1">
-            <a:off x="3045830" y="5272777"/>
-            <a:ext cx="497116" cy="388471"/>
-          </a:xfrm>
-          <a:prstGeom prst="straightConnector1">
-            <a:avLst/>
-          </a:prstGeom>
-          <a:ln w="28575">
-            <a:solidFill>
-              <a:schemeClr val="tx1"/>
-            </a:solidFill>
-            <a:tailEnd type="triangle"/>
-          </a:ln>
-        </p:spPr>
-        <p:style>
-          <a:lnRef idx="1">
-            <a:schemeClr val="accent1"/>
-          </a:lnRef>
-          <a:fillRef idx="0">
-            <a:schemeClr val="accent1"/>
-          </a:fillRef>
-          <a:effectRef idx="0">
-            <a:schemeClr val="accent1"/>
-          </a:effectRef>
-          <a:fontRef idx="minor">
-            <a:schemeClr val="tx1"/>
-          </a:fontRef>
-        </p:style>
-      </p:cxnSp>
+      </p:pic>
     </p:spTree>
     <p:extLst>
       <p:ext uri="{BB962C8B-B14F-4D97-AF65-F5344CB8AC3E}">
-        <p14:creationId xmlns:p14="http://schemas.microsoft.com/office/powerpoint/2010/main" val="2726121724"/>
+        <p14:creationId xmlns:p14="http://schemas.microsoft.com/office/powerpoint/2010/main" val="1933440645"/>
       </p:ext>
     </p:extLst>
   </p:cSld>
   <p:clrMapOvr>
     <a:masterClrMapping/>
   </p:clrMapOvr>
+  <p:timing>
+    <p:tnLst>
+      <p:par>
+        <p:cTn id="1" dur="indefinite" restart="never" nodeType="tmRoot">
+          <p:childTnLst>
+            <p:seq concurrent="1" nextAc="seek">
+              <p:cTn id="2" dur="indefinite" nodeType="mainSeq">
+                <p:childTnLst>
+                  <p:par>
+                    <p:cTn id="3" fill="hold">
+                      <p:stCondLst>
+                        <p:cond delay="indefinite"/>
+                      </p:stCondLst>
+                      <p:childTnLst>
+                        <p:par>
+                          <p:cTn id="4" fill="hold">
+                            <p:stCondLst>
+                              <p:cond delay="0"/>
+                            </p:stCondLst>
+                            <p:childTnLst>
+                              <p:par>
+                                <p:cTn id="5" presetID="10" presetClass="entr" presetSubtype="0" fill="hold" nodeType="clickEffect">
+                                  <p:stCondLst>
+                                    <p:cond delay="0"/>
+                                  </p:stCondLst>
+                                  <p:childTnLst>
+                                    <p:set>
+                                      <p:cBhvr>
+                                        <p:cTn id="6" dur="1" fill="hold">
+                                          <p:stCondLst>
+                                            <p:cond delay="0"/>
+                                          </p:stCondLst>
+                                        </p:cTn>
+                                        <p:tgtEl>
+                                          <p:spTgt spid="11"/>
+                                        </p:tgtEl>
+                                        <p:attrNameLst>
+                                          <p:attrName>style.visibility</p:attrName>
+                                        </p:attrNameLst>
+                                      </p:cBhvr>
+                                      <p:to>
+                                        <p:strVal val="visible"/>
+                                      </p:to>
+                                    </p:set>
+                                    <p:animEffect transition="in" filter="fade">
+                                      <p:cBhvr>
+                                        <p:cTn id="7" dur="500"/>
+                                        <p:tgtEl>
+                                          <p:spTgt spid="11"/>
+                                        </p:tgtEl>
+                                      </p:cBhvr>
+                                    </p:animEffect>
+                                  </p:childTnLst>
+                                </p:cTn>
+                              </p:par>
+                            </p:childTnLst>
+                          </p:cTn>
+                        </p:par>
+                      </p:childTnLst>
+                    </p:cTn>
+                  </p:par>
+                </p:childTnLst>
+              </p:cTn>
+              <p:prevCondLst>
+                <p:cond evt="onPrev" delay="0">
+                  <p:tgtEl>
+                    <p:sldTgt/>
+                  </p:tgtEl>
+                </p:cond>
+              </p:prevCondLst>
+              <p:nextCondLst>
+                <p:cond evt="onNext" delay="0">
+                  <p:tgtEl>
+                    <p:sldTgt/>
+                  </p:tgtEl>
+                </p:cond>
+              </p:nextCondLst>
+            </p:seq>
+          </p:childTnLst>
+        </p:cTn>
+      </p:par>
+    </p:tnLst>
+  </p:timing>
 </p:sld>
 </file>
 
@@ -9920,14 +8813,14 @@
             </a:pPr>
             <a:r>
               <a:rPr lang="en-US" sz="2800" smtClean="0"/>
-              <a:t>3.2 Use case quản lý phòng trọ</a:t>
-            </a:r>
-          </a:p>
-          <a:p>
-            <a:pPr marL="0" indent="0">
-              <a:buNone/>
-            </a:pPr>
-            <a:endParaRPr lang="en-US" sz="2400" smtClean="0"/>
+              <a:t>3.2 Use case chi tiết</a:t>
+            </a:r>
+          </a:p>
+          <a:p>
+            <a:r>
+              <a:rPr lang="en-US" sz="2800" smtClean="0"/>
+              <a:t>Quản lý hóa đơn</a:t>
+            </a:r>
           </a:p>
         </p:txBody>
       </p:sp>
@@ -9948,7 +8841,7 @@
           <a:p>
             <a:fld id="{3BD01B09-9BFA-4E25-B6F7-A45121277496}" type="datetime1">
               <a:rPr lang="vi-VN" smtClean="0"/>
-              <a:t>19/05/2024</a:t>
+              <a:t>22/05/2024</a:t>
             </a:fld>
             <a:endParaRPr lang="en-US"/>
           </a:p>
@@ -10000,311 +8893,28 @@
           </a:p>
         </p:txBody>
       </p:sp>
-      <p:sp>
-        <p:nvSpPr>
-          <p:cNvPr id="7" name="Oval 6"/>
-          <p:cNvSpPr/>
+      <p:pic>
+        <p:nvPicPr>
+          <p:cNvPr id="8" name="Picture 7"/>
+          <p:cNvPicPr/>
           <p:nvPr/>
-        </p:nvSpPr>
+        </p:nvPicPr>
+        <p:blipFill>
+          <a:blip r:embed="rId3">
+            <a:extLst>
+              <a:ext uri="{28A0092B-C50C-407E-A947-70E740481C1C}">
+                <a14:useLocalDpi xmlns:a14="http://schemas.microsoft.com/office/drawing/2010/main" val="0"/>
+              </a:ext>
+            </a:extLst>
+          </a:blip>
+          <a:stretch>
+            <a:fillRect/>
+          </a:stretch>
+        </p:blipFill>
         <p:spPr>
           <a:xfrm>
-            <a:off x="1403648" y="3068960"/>
-            <a:ext cx="1728192" cy="864096"/>
-          </a:xfrm>
-          <a:prstGeom prst="ellipse">
-            <a:avLst/>
-          </a:prstGeom>
-          <a:solidFill>
-            <a:schemeClr val="tx1"/>
-          </a:solidFill>
-        </p:spPr>
-        <p:style>
-          <a:lnRef idx="2">
-            <a:schemeClr val="accent1">
-              <a:shade val="50000"/>
-            </a:schemeClr>
-          </a:lnRef>
-          <a:fillRef idx="1">
-            <a:schemeClr val="accent1"/>
-          </a:fillRef>
-          <a:effectRef idx="0">
-            <a:schemeClr val="accent1"/>
-          </a:effectRef>
-          <a:fontRef idx="minor">
-            <a:schemeClr val="lt1"/>
-          </a:fontRef>
-        </p:style>
-        <p:txBody>
-          <a:bodyPr rtlCol="0" anchor="ctr"/>
-          <a:lstStyle/>
-          <a:p>
-            <a:pPr algn="ctr"/>
-            <a:r>
-              <a:rPr lang="en-US" smtClean="0">
-                <a:solidFill>
-                  <a:schemeClr val="bg1"/>
-                </a:solidFill>
-                <a:latin typeface="Arial" panose="020B0604020202020204" pitchFamily="34" charset="0"/>
-                <a:cs typeface="Arial" panose="020B0604020202020204" pitchFamily="34" charset="0"/>
-              </a:rPr>
-              <a:t>Cập nhật</a:t>
-            </a:r>
-            <a:endParaRPr lang="en-US">
-              <a:solidFill>
-                <a:schemeClr val="bg1"/>
-              </a:solidFill>
-              <a:latin typeface="Arial" panose="020B0604020202020204" pitchFamily="34" charset="0"/>
-              <a:cs typeface="Arial" panose="020B0604020202020204" pitchFamily="34" charset="0"/>
-            </a:endParaRPr>
-          </a:p>
-        </p:txBody>
-      </p:sp>
-      <p:sp>
-        <p:nvSpPr>
-          <p:cNvPr id="8" name="Oval 7"/>
-          <p:cNvSpPr/>
-          <p:nvPr/>
-        </p:nvSpPr>
-        <p:spPr>
-          <a:xfrm>
-            <a:off x="3354865" y="2888005"/>
-            <a:ext cx="1728192" cy="864096"/>
-          </a:xfrm>
-          <a:prstGeom prst="ellipse">
-            <a:avLst/>
-          </a:prstGeom>
-          <a:solidFill>
-            <a:schemeClr val="tx1"/>
-          </a:solidFill>
-        </p:spPr>
-        <p:style>
-          <a:lnRef idx="2">
-            <a:schemeClr val="accent1">
-              <a:shade val="50000"/>
-            </a:schemeClr>
-          </a:lnRef>
-          <a:fillRef idx="1">
-            <a:schemeClr val="accent1"/>
-          </a:fillRef>
-          <a:effectRef idx="0">
-            <a:schemeClr val="accent1"/>
-          </a:effectRef>
-          <a:fontRef idx="minor">
-            <a:schemeClr val="lt1"/>
-          </a:fontRef>
-        </p:style>
-        <p:txBody>
-          <a:bodyPr rtlCol="0" anchor="ctr"/>
-          <a:lstStyle/>
-          <a:p>
-            <a:pPr algn="ctr"/>
-            <a:r>
-              <a:rPr lang="en-US" smtClean="0">
-                <a:solidFill>
-                  <a:schemeClr val="bg1"/>
-                </a:solidFill>
-                <a:latin typeface="Arial" panose="020B0604020202020204" pitchFamily="34" charset="0"/>
-                <a:cs typeface="Arial" panose="020B0604020202020204" pitchFamily="34" charset="0"/>
-              </a:rPr>
-              <a:t>Xóa</a:t>
-            </a:r>
-            <a:endParaRPr lang="en-US">
-              <a:solidFill>
-                <a:schemeClr val="bg1"/>
-              </a:solidFill>
-              <a:latin typeface="Arial" panose="020B0604020202020204" pitchFamily="34" charset="0"/>
-              <a:cs typeface="Arial" panose="020B0604020202020204" pitchFamily="34" charset="0"/>
-            </a:endParaRPr>
-          </a:p>
-        </p:txBody>
-      </p:sp>
-      <p:sp>
-        <p:nvSpPr>
-          <p:cNvPr id="9" name="Oval 8"/>
-          <p:cNvSpPr/>
-          <p:nvPr/>
-        </p:nvSpPr>
-        <p:spPr>
-          <a:xfrm>
-            <a:off x="5306082" y="2888005"/>
-            <a:ext cx="1728192" cy="864096"/>
-          </a:xfrm>
-          <a:prstGeom prst="ellipse">
-            <a:avLst/>
-          </a:prstGeom>
-          <a:solidFill>
-            <a:schemeClr val="tx1"/>
-          </a:solidFill>
-        </p:spPr>
-        <p:style>
-          <a:lnRef idx="2">
-            <a:schemeClr val="accent1">
-              <a:shade val="50000"/>
-            </a:schemeClr>
-          </a:lnRef>
-          <a:fillRef idx="1">
-            <a:schemeClr val="accent1"/>
-          </a:fillRef>
-          <a:effectRef idx="0">
-            <a:schemeClr val="accent1"/>
-          </a:effectRef>
-          <a:fontRef idx="minor">
-            <a:schemeClr val="lt1"/>
-          </a:fontRef>
-        </p:style>
-        <p:txBody>
-          <a:bodyPr rtlCol="0" anchor="ctr"/>
-          <a:lstStyle/>
-          <a:p>
-            <a:pPr algn="ctr"/>
-            <a:r>
-              <a:rPr lang="en-US" smtClean="0">
-                <a:solidFill>
-                  <a:schemeClr val="bg1"/>
-                </a:solidFill>
-                <a:latin typeface="Arial" panose="020B0604020202020204" pitchFamily="34" charset="0"/>
-                <a:cs typeface="Arial" panose="020B0604020202020204" pitchFamily="34" charset="0"/>
-              </a:rPr>
-              <a:t>Cập nhật trạng thái</a:t>
-            </a:r>
-            <a:endParaRPr lang="en-US">
-              <a:solidFill>
-                <a:schemeClr val="bg1"/>
-              </a:solidFill>
-              <a:latin typeface="Arial" panose="020B0604020202020204" pitchFamily="34" charset="0"/>
-              <a:cs typeface="Arial" panose="020B0604020202020204" pitchFamily="34" charset="0"/>
-            </a:endParaRPr>
-          </a:p>
-        </p:txBody>
-      </p:sp>
-      <p:sp>
-        <p:nvSpPr>
-          <p:cNvPr id="10" name="Oval 9"/>
-          <p:cNvSpPr/>
-          <p:nvPr/>
-        </p:nvSpPr>
-        <p:spPr>
-          <a:xfrm>
-            <a:off x="827584" y="4365104"/>
-            <a:ext cx="1728192" cy="864096"/>
-          </a:xfrm>
-          <a:prstGeom prst="ellipse">
-            <a:avLst/>
-          </a:prstGeom>
-          <a:solidFill>
-            <a:schemeClr val="tx1"/>
-          </a:solidFill>
-        </p:spPr>
-        <p:style>
-          <a:lnRef idx="2">
-            <a:schemeClr val="accent1">
-              <a:shade val="50000"/>
-            </a:schemeClr>
-          </a:lnRef>
-          <a:fillRef idx="1">
-            <a:schemeClr val="accent1"/>
-          </a:fillRef>
-          <a:effectRef idx="0">
-            <a:schemeClr val="accent1"/>
-          </a:effectRef>
-          <a:fontRef idx="minor">
-            <a:schemeClr val="lt1"/>
-          </a:fontRef>
-        </p:style>
-        <p:txBody>
-          <a:bodyPr rtlCol="0" anchor="ctr"/>
-          <a:lstStyle/>
-          <a:p>
-            <a:pPr algn="ctr"/>
-            <a:r>
-              <a:rPr lang="en-US" smtClean="0">
-                <a:solidFill>
-                  <a:schemeClr val="bg1"/>
-                </a:solidFill>
-                <a:latin typeface="Arial" panose="020B0604020202020204" pitchFamily="34" charset="0"/>
-                <a:cs typeface="Arial" panose="020B0604020202020204" pitchFamily="34" charset="0"/>
-              </a:rPr>
-              <a:t>Thêm mới</a:t>
-            </a:r>
-            <a:endParaRPr lang="en-US">
-              <a:solidFill>
-                <a:schemeClr val="bg1"/>
-              </a:solidFill>
-              <a:latin typeface="Arial" panose="020B0604020202020204" pitchFamily="34" charset="0"/>
-              <a:cs typeface="Arial" panose="020B0604020202020204" pitchFamily="34" charset="0"/>
-            </a:endParaRPr>
-          </a:p>
-        </p:txBody>
-      </p:sp>
-      <p:sp>
-        <p:nvSpPr>
-          <p:cNvPr id="13" name="Oval 12"/>
-          <p:cNvSpPr/>
-          <p:nvPr/>
-        </p:nvSpPr>
-        <p:spPr>
-          <a:xfrm>
-            <a:off x="6191066" y="5066544"/>
-            <a:ext cx="2743305" cy="864096"/>
-          </a:xfrm>
-          <a:prstGeom prst="ellipse">
-            <a:avLst/>
-          </a:prstGeom>
-          <a:solidFill>
-            <a:schemeClr val="tx1"/>
-          </a:solidFill>
-        </p:spPr>
-        <p:style>
-          <a:lnRef idx="2">
-            <a:schemeClr val="accent1">
-              <a:shade val="50000"/>
-            </a:schemeClr>
-          </a:lnRef>
-          <a:fillRef idx="1">
-            <a:schemeClr val="accent1"/>
-          </a:fillRef>
-          <a:effectRef idx="0">
-            <a:schemeClr val="accent1"/>
-          </a:effectRef>
-          <a:fontRef idx="minor">
-            <a:schemeClr val="lt1"/>
-          </a:fontRef>
-        </p:style>
-        <p:txBody>
-          <a:bodyPr rtlCol="0" anchor="ctr"/>
-          <a:lstStyle/>
-          <a:p>
-            <a:pPr algn="ctr"/>
-            <a:r>
-              <a:rPr lang="en-US" smtClean="0">
-                <a:solidFill>
-                  <a:schemeClr val="bg1"/>
-                </a:solidFill>
-                <a:latin typeface="Arial" panose="020B0604020202020204" pitchFamily="34" charset="0"/>
-                <a:cs typeface="Arial" panose="020B0604020202020204" pitchFamily="34" charset="0"/>
-              </a:rPr>
-              <a:t>Xem Danh sách</a:t>
-            </a:r>
-            <a:endParaRPr lang="en-US">
-              <a:solidFill>
-                <a:schemeClr val="bg1"/>
-              </a:solidFill>
-              <a:latin typeface="Arial" panose="020B0604020202020204" pitchFamily="34" charset="0"/>
-              <a:cs typeface="Arial" panose="020B0604020202020204" pitchFamily="34" charset="0"/>
-            </a:endParaRPr>
-          </a:p>
-        </p:txBody>
-      </p:sp>
-      <p:sp>
-        <p:nvSpPr>
-          <p:cNvPr id="15" name="Rectangle 14"/>
-          <p:cNvSpPr/>
-          <p:nvPr/>
-        </p:nvSpPr>
-        <p:spPr>
-          <a:xfrm>
-            <a:off x="3491880" y="4365104"/>
-            <a:ext cx="1814202" cy="914400"/>
+            <a:off x="472500" y="1118586"/>
+            <a:ext cx="8134806" cy="4686678"/>
           </a:xfrm>
           <a:prstGeom prst="rect">
             <a:avLst/>
@@ -10313,246 +8923,100 @@
             <a:schemeClr val="tx1"/>
           </a:solidFill>
         </p:spPr>
-        <p:style>
-          <a:lnRef idx="2">
-            <a:schemeClr val="accent1">
-              <a:shade val="50000"/>
-            </a:schemeClr>
-          </a:lnRef>
-          <a:fillRef idx="1">
-            <a:schemeClr val="accent1"/>
-          </a:fillRef>
-          <a:effectRef idx="0">
-            <a:schemeClr val="accent1"/>
-          </a:effectRef>
-          <a:fontRef idx="minor">
-            <a:schemeClr val="lt1"/>
-          </a:fontRef>
-        </p:style>
-        <p:txBody>
-          <a:bodyPr rtlCol="0" anchor="ctr"/>
-          <a:lstStyle/>
-          <a:p>
-            <a:pPr algn="ctr"/>
-            <a:r>
-              <a:rPr lang="en-US" sz="2000" smtClean="0">
-                <a:solidFill>
-                  <a:schemeClr val="bg1"/>
-                </a:solidFill>
-                <a:latin typeface="Arial" panose="020B0604020202020204" pitchFamily="34" charset="0"/>
-                <a:cs typeface="Arial" panose="020B0604020202020204" pitchFamily="34" charset="0"/>
-              </a:rPr>
-              <a:t>Chủ trọ</a:t>
-            </a:r>
-            <a:endParaRPr lang="en-US" sz="2000">
-              <a:solidFill>
-                <a:schemeClr val="bg1"/>
-              </a:solidFill>
-              <a:latin typeface="Arial" panose="020B0604020202020204" pitchFamily="34" charset="0"/>
-              <a:cs typeface="Arial" panose="020B0604020202020204" pitchFamily="34" charset="0"/>
-            </a:endParaRPr>
-          </a:p>
-        </p:txBody>
-      </p:sp>
-      <p:cxnSp>
-        <p:nvCxnSpPr>
-          <p:cNvPr id="17" name="Straight Arrow Connector 16"/>
-          <p:cNvCxnSpPr>
-            <a:endCxn id="7" idx="5"/>
-          </p:cNvCxnSpPr>
-          <p:nvPr/>
-        </p:nvCxnSpPr>
-        <p:spPr>
-          <a:xfrm flipH="1" flipV="1">
-            <a:off x="2878752" y="3806512"/>
-            <a:ext cx="613128" cy="558592"/>
-          </a:xfrm>
-          <a:prstGeom prst="straightConnector1">
-            <a:avLst/>
-          </a:prstGeom>
-          <a:ln w="28575">
-            <a:solidFill>
-              <a:schemeClr val="tx1"/>
-            </a:solidFill>
-            <a:tailEnd type="triangle"/>
-          </a:ln>
-        </p:spPr>
-        <p:style>
-          <a:lnRef idx="1">
-            <a:schemeClr val="accent1"/>
-          </a:lnRef>
-          <a:fillRef idx="0">
-            <a:schemeClr val="accent1"/>
-          </a:fillRef>
-          <a:effectRef idx="0">
-            <a:schemeClr val="accent1"/>
-          </a:effectRef>
-          <a:fontRef idx="minor">
-            <a:schemeClr val="tx1"/>
-          </a:fontRef>
-        </p:style>
-      </p:cxnSp>
-      <p:cxnSp>
-        <p:nvCxnSpPr>
-          <p:cNvPr id="18" name="Straight Arrow Connector 17"/>
-          <p:cNvCxnSpPr>
-            <a:endCxn id="8" idx="4"/>
-          </p:cNvCxnSpPr>
-          <p:nvPr/>
-        </p:nvCxnSpPr>
-        <p:spPr>
-          <a:xfrm flipV="1">
-            <a:off x="4218961" y="3752101"/>
-            <a:ext cx="0" cy="613003"/>
-          </a:xfrm>
-          <a:prstGeom prst="straightConnector1">
-            <a:avLst/>
-          </a:prstGeom>
-          <a:ln w="28575">
-            <a:solidFill>
-              <a:schemeClr val="tx1"/>
-            </a:solidFill>
-            <a:tailEnd type="triangle"/>
-          </a:ln>
-        </p:spPr>
-        <p:style>
-          <a:lnRef idx="1">
-            <a:schemeClr val="accent1"/>
-          </a:lnRef>
-          <a:fillRef idx="0">
-            <a:schemeClr val="accent1"/>
-          </a:fillRef>
-          <a:effectRef idx="0">
-            <a:schemeClr val="accent1"/>
-          </a:effectRef>
-          <a:fontRef idx="minor">
-            <a:schemeClr val="tx1"/>
-          </a:fontRef>
-        </p:style>
-      </p:cxnSp>
-      <p:cxnSp>
-        <p:nvCxnSpPr>
-          <p:cNvPr id="21" name="Straight Arrow Connector 20"/>
-          <p:cNvCxnSpPr/>
-          <p:nvPr/>
-        </p:nvCxnSpPr>
-        <p:spPr>
-          <a:xfrm flipV="1">
-            <a:off x="4966984" y="3688830"/>
-            <a:ext cx="894158" cy="676274"/>
-          </a:xfrm>
-          <a:prstGeom prst="straightConnector1">
-            <a:avLst/>
-          </a:prstGeom>
-          <a:ln w="28575">
-            <a:solidFill>
-              <a:schemeClr val="tx1"/>
-            </a:solidFill>
-            <a:tailEnd type="triangle"/>
-          </a:ln>
-        </p:spPr>
-        <p:style>
-          <a:lnRef idx="1">
-            <a:schemeClr val="accent1"/>
-          </a:lnRef>
-          <a:fillRef idx="0">
-            <a:schemeClr val="accent1"/>
-          </a:fillRef>
-          <a:effectRef idx="0">
-            <a:schemeClr val="accent1"/>
-          </a:effectRef>
-          <a:fontRef idx="minor">
-            <a:schemeClr val="tx1"/>
-          </a:fontRef>
-        </p:style>
-      </p:cxnSp>
-      <p:cxnSp>
-        <p:nvCxnSpPr>
-          <p:cNvPr id="31" name="Straight Arrow Connector 30"/>
-          <p:cNvCxnSpPr>
-            <a:endCxn id="10" idx="6"/>
-          </p:cNvCxnSpPr>
-          <p:nvPr/>
-        </p:nvCxnSpPr>
-        <p:spPr>
-          <a:xfrm flipH="1">
-            <a:off x="2555776" y="4709731"/>
-            <a:ext cx="936104" cy="87421"/>
-          </a:xfrm>
-          <a:prstGeom prst="straightConnector1">
-            <a:avLst/>
-          </a:prstGeom>
-          <a:ln w="28575">
-            <a:solidFill>
-              <a:schemeClr val="tx1"/>
-            </a:solidFill>
-            <a:tailEnd type="triangle"/>
-          </a:ln>
-        </p:spPr>
-        <p:style>
-          <a:lnRef idx="1">
-            <a:schemeClr val="accent1"/>
-          </a:lnRef>
-          <a:fillRef idx="0">
-            <a:schemeClr val="accent1"/>
-          </a:fillRef>
-          <a:effectRef idx="0">
-            <a:schemeClr val="accent1"/>
-          </a:effectRef>
-          <a:fontRef idx="minor">
-            <a:schemeClr val="tx1"/>
-          </a:fontRef>
-        </p:style>
-      </p:cxnSp>
-      <p:cxnSp>
-        <p:nvCxnSpPr>
-          <p:cNvPr id="34" name="Straight Arrow Connector 33"/>
-          <p:cNvCxnSpPr>
-            <a:stCxn id="15" idx="3"/>
-            <a:endCxn id="13" idx="1"/>
-          </p:cNvCxnSpPr>
-          <p:nvPr/>
-        </p:nvCxnSpPr>
-        <p:spPr>
-          <a:xfrm>
-            <a:off x="5306082" y="4822304"/>
-            <a:ext cx="1286732" cy="370784"/>
-          </a:xfrm>
-          <a:prstGeom prst="straightConnector1">
-            <a:avLst/>
-          </a:prstGeom>
-          <a:ln w="28575">
-            <a:solidFill>
-              <a:schemeClr val="tx1"/>
-            </a:solidFill>
-            <a:tailEnd type="triangle"/>
-          </a:ln>
-        </p:spPr>
-        <p:style>
-          <a:lnRef idx="1">
-            <a:schemeClr val="accent1"/>
-          </a:lnRef>
-          <a:fillRef idx="0">
-            <a:schemeClr val="accent1"/>
-          </a:fillRef>
-          <a:effectRef idx="0">
-            <a:schemeClr val="accent1"/>
-          </a:effectRef>
-          <a:fontRef idx="minor">
-            <a:schemeClr val="tx1"/>
-          </a:fontRef>
-        </p:style>
-      </p:cxnSp>
+      </p:pic>
     </p:spTree>
     <p:extLst>
       <p:ext uri="{BB962C8B-B14F-4D97-AF65-F5344CB8AC3E}">
-        <p14:creationId xmlns:p14="http://schemas.microsoft.com/office/powerpoint/2010/main" val="452447874"/>
+        <p14:creationId xmlns:p14="http://schemas.microsoft.com/office/powerpoint/2010/main" val="2803947502"/>
       </p:ext>
     </p:extLst>
   </p:cSld>
   <p:clrMapOvr>
     <a:masterClrMapping/>
   </p:clrMapOvr>
+  <p:timing>
+    <p:tnLst>
+      <p:par>
+        <p:cTn id="1" dur="indefinite" restart="never" nodeType="tmRoot">
+          <p:childTnLst>
+            <p:seq concurrent="1" nextAc="seek">
+              <p:cTn id="2" dur="indefinite" nodeType="mainSeq">
+                <p:childTnLst>
+                  <p:par>
+                    <p:cTn id="3" fill="hold">
+                      <p:stCondLst>
+                        <p:cond delay="indefinite"/>
+                      </p:stCondLst>
+                      <p:childTnLst>
+                        <p:par>
+                          <p:cTn id="4" fill="hold">
+                            <p:stCondLst>
+                              <p:cond delay="0"/>
+                            </p:stCondLst>
+                            <p:childTnLst>
+                              <p:par>
+                                <p:cTn id="5" presetID="10" presetClass="entr" presetSubtype="0" fill="hold" nodeType="clickEffect">
+                                  <p:stCondLst>
+                                    <p:cond delay="0"/>
+                                  </p:stCondLst>
+                                  <p:childTnLst>
+                                    <p:set>
+                                      <p:cBhvr>
+                                        <p:cTn id="6" dur="1" fill="hold">
+                                          <p:stCondLst>
+                                            <p:cond delay="0"/>
+                                          </p:stCondLst>
+                                        </p:cTn>
+                                        <p:tgtEl>
+                                          <p:spTgt spid="8"/>
+                                        </p:tgtEl>
+                                        <p:attrNameLst>
+                                          <p:attrName>style.visibility</p:attrName>
+                                        </p:attrNameLst>
+                                      </p:cBhvr>
+                                      <p:to>
+                                        <p:strVal val="visible"/>
+                                      </p:to>
+                                    </p:set>
+                                    <p:animEffect transition="in" filter="fade">
+                                      <p:cBhvr>
+                                        <p:cTn id="7" dur="500"/>
+                                        <p:tgtEl>
+                                          <p:spTgt spid="8"/>
+                                        </p:tgtEl>
+                                      </p:cBhvr>
+                                    </p:animEffect>
+                                  </p:childTnLst>
+                                </p:cTn>
+                              </p:par>
+                            </p:childTnLst>
+                          </p:cTn>
+                        </p:par>
+                      </p:childTnLst>
+                    </p:cTn>
+                  </p:par>
+                </p:childTnLst>
+              </p:cTn>
+              <p:prevCondLst>
+                <p:cond evt="onPrev" delay="0">
+                  <p:tgtEl>
+                    <p:sldTgt/>
+                  </p:tgtEl>
+                </p:cond>
+              </p:prevCondLst>
+              <p:nextCondLst>
+                <p:cond evt="onNext" delay="0">
+                  <p:tgtEl>
+                    <p:sldTgt/>
+                  </p:tgtEl>
+                </p:cond>
+              </p:nextCondLst>
+            </p:seq>
+          </p:childTnLst>
+        </p:cTn>
+      </p:par>
+    </p:tnLst>
+  </p:timing>
 </p:sld>
 </file>
 
@@ -11301,15 +9765,6 @@
 </file>
 
 <file path=customXml/item2.xml><?xml version="1.0" encoding="utf-8"?>
-<?mso-contentType ?>
-<FormTemplates xmlns="http://schemas.microsoft.com/sharepoint/v3/contenttype/forms">
-  <Display>DocumentLibraryForm</Display>
-  <Edit>DocumentLibraryForm</Edit>
-  <New>DocumentLibraryForm</New>
-</FormTemplates>
-</file>
-
-<file path=customXml/item3.xml><?xml version="1.0" encoding="utf-8"?>
 <p:properties xmlns:p="http://schemas.microsoft.com/office/2006/metadata/properties" xmlns:xsi="http://www.w3.org/2001/XMLSchema-instance" xmlns:pc="http://schemas.microsoft.com/office/infopath/2007/PartnerControls">
   <documentManagement>
     <lcf76f155ced4ddcb4097134ff3c332f xmlns="153fcabd-57af-4a56-8983-dd18762d0f52">
@@ -11318,6 +9773,15 @@
     <TaxCatchAll xmlns="2d536adb-6e4e-486d-ab56-aaa6984defbe" xsi:nil="true"/>
   </documentManagement>
 </p:properties>
+</file>
+
+<file path=customXml/item3.xml><?xml version="1.0" encoding="utf-8"?>
+<?mso-contentType ?>
+<FormTemplates xmlns="http://schemas.microsoft.com/sharepoint/v3/contenttype/forms">
+  <Display>DocumentLibraryForm</Display>
+  <Edit>DocumentLibraryForm</Edit>
+  <New>DocumentLibraryForm</New>
+</FormTemplates>
 </file>
 
 <file path=customXml/itemProps1.xml><?xml version="1.0" encoding="utf-8"?>
@@ -11340,14 +9804,6 @@
 </file>
 
 <file path=customXml/itemProps2.xml><?xml version="1.0" encoding="utf-8"?>
-<ds:datastoreItem xmlns:ds="http://schemas.openxmlformats.org/officeDocument/2006/customXml" ds:itemID="{3956FB51-9556-42E2-AEC7-29477AB8B646}">
-  <ds:schemaRefs>
-    <ds:schemaRef ds:uri="http://schemas.microsoft.com/sharepoint/v3/contenttype/forms"/>
-  </ds:schemaRefs>
-</ds:datastoreItem>
-</file>
-
-<file path=customXml/itemProps3.xml><?xml version="1.0" encoding="utf-8"?>
 <ds:datastoreItem xmlns:ds="http://schemas.openxmlformats.org/officeDocument/2006/customXml" ds:itemID="{B267F815-AB44-4B44-9DF3-CE62F88C2482}">
   <ds:schemaRefs>
     <ds:schemaRef ds:uri="http://purl.org/dc/dcmitype/"/>
@@ -11362,4 +9818,12 @@
     <ds:schemaRef ds:uri="http://purl.org/dc/elements/1.1/"/>
   </ds:schemaRefs>
 </ds:datastoreItem>
+</file>
+
+<file path=customXml/itemProps3.xml><?xml version="1.0" encoding="utf-8"?>
+<ds:datastoreItem xmlns:ds="http://schemas.openxmlformats.org/officeDocument/2006/customXml" ds:itemID="{3956FB51-9556-42E2-AEC7-29477AB8B646}">
+  <ds:schemaRefs>
+    <ds:schemaRef ds:uri="http://schemas.microsoft.com/sharepoint/v3/contenttype/forms"/>
+  </ds:schemaRefs>
+</ds:datastoreItem>
 </file>
</xml_diff>